<commit_message>
Added som result graphs
</commit_message>
<xml_diff>
--- a/Exjobbspresentation.pptx
+++ b/Exjobbspresentation.pptx
@@ -10326,10 +10326,154 @@
               </a:spcBef>
               <a:buNone/>
             </a:pPr>
-            <a:endParaRPr/>
+            <a:endParaRPr dirty="0"/>
           </a:p>
         </p:txBody>
       </p:sp>
+      <p:pic>
+        <p:nvPicPr>
+          <p:cNvPr id="3" name="Bild 2">
+            <a:extLst>
+              <a:ext uri="{FF2B5EF4-FFF2-40B4-BE49-F238E27FC236}">
+                <a16:creationId xmlns:a16="http://schemas.microsoft.com/office/drawing/2014/main" id="{1D35305D-9F40-4DD2-A34E-7FF6E1C37A22}"/>
+              </a:ext>
+            </a:extLst>
+          </p:cNvPr>
+          <p:cNvPicPr>
+            <a:picLocks noChangeAspect="1"/>
+          </p:cNvPicPr>
+          <p:nvPr/>
+        </p:nvPicPr>
+        <p:blipFill>
+          <a:blip r:embed="rId3">
+            <a:extLst>
+              <a:ext uri="{96DAC541-7B7A-43D3-8B79-37D633B846F1}">
+                <asvg:svgBlip xmlns:asvg="http://schemas.microsoft.com/office/drawing/2016/SVG/main" r:embed="rId4"/>
+              </a:ext>
+            </a:extLst>
+          </a:blip>
+          <a:stretch>
+            <a:fillRect/>
+          </a:stretch>
+        </p:blipFill>
+        <p:spPr>
+          <a:xfrm>
+            <a:off x="0" y="0"/>
+            <a:ext cx="4585349" cy="2579259"/>
+          </a:xfrm>
+          <a:prstGeom prst="rect">
+            <a:avLst/>
+          </a:prstGeom>
+        </p:spPr>
+      </p:pic>
+      <p:pic>
+        <p:nvPicPr>
+          <p:cNvPr id="5" name="Bild 4">
+            <a:extLst>
+              <a:ext uri="{FF2B5EF4-FFF2-40B4-BE49-F238E27FC236}">
+                <a16:creationId xmlns:a16="http://schemas.microsoft.com/office/drawing/2014/main" id="{24002787-C252-4AD8-89C2-CB4C0142BF52}"/>
+              </a:ext>
+            </a:extLst>
+          </p:cNvPr>
+          <p:cNvPicPr>
+            <a:picLocks noChangeAspect="1"/>
+          </p:cNvPicPr>
+          <p:nvPr/>
+        </p:nvPicPr>
+        <p:blipFill>
+          <a:blip r:embed="rId5">
+            <a:extLst>
+              <a:ext uri="{96DAC541-7B7A-43D3-8B79-37D633B846F1}">
+                <asvg:svgBlip xmlns:asvg="http://schemas.microsoft.com/office/drawing/2016/SVG/main" r:embed="rId6"/>
+              </a:ext>
+            </a:extLst>
+          </a:blip>
+          <a:stretch>
+            <a:fillRect/>
+          </a:stretch>
+        </p:blipFill>
+        <p:spPr>
+          <a:xfrm>
+            <a:off x="0" y="2579258"/>
+            <a:ext cx="4558651" cy="2564241"/>
+          </a:xfrm>
+          <a:prstGeom prst="rect">
+            <a:avLst/>
+          </a:prstGeom>
+        </p:spPr>
+      </p:pic>
+      <p:pic>
+        <p:nvPicPr>
+          <p:cNvPr id="7" name="Bild 6">
+            <a:extLst>
+              <a:ext uri="{FF2B5EF4-FFF2-40B4-BE49-F238E27FC236}">
+                <a16:creationId xmlns:a16="http://schemas.microsoft.com/office/drawing/2014/main" id="{D168B5DB-4061-4145-B9DD-861FA1EF8394}"/>
+              </a:ext>
+            </a:extLst>
+          </p:cNvPr>
+          <p:cNvPicPr>
+            <a:picLocks noChangeAspect="1"/>
+          </p:cNvPicPr>
+          <p:nvPr/>
+        </p:nvPicPr>
+        <p:blipFill>
+          <a:blip r:embed="rId7">
+            <a:extLst>
+              <a:ext uri="{96DAC541-7B7A-43D3-8B79-37D633B846F1}">
+                <asvg:svgBlip xmlns:asvg="http://schemas.microsoft.com/office/drawing/2016/SVG/main" r:embed="rId8"/>
+              </a:ext>
+            </a:extLst>
+          </a:blip>
+          <a:stretch>
+            <a:fillRect/>
+          </a:stretch>
+        </p:blipFill>
+        <p:spPr>
+          <a:xfrm>
+            <a:off x="4585348" y="2579258"/>
+            <a:ext cx="4558652" cy="2564242"/>
+          </a:xfrm>
+          <a:prstGeom prst="rect">
+            <a:avLst/>
+          </a:prstGeom>
+        </p:spPr>
+      </p:pic>
+      <p:pic>
+        <p:nvPicPr>
+          <p:cNvPr id="9" name="Bild 8">
+            <a:extLst>
+              <a:ext uri="{FF2B5EF4-FFF2-40B4-BE49-F238E27FC236}">
+                <a16:creationId xmlns:a16="http://schemas.microsoft.com/office/drawing/2014/main" id="{877DE451-F94F-4BF2-B6C3-FD9E64523853}"/>
+              </a:ext>
+            </a:extLst>
+          </p:cNvPr>
+          <p:cNvPicPr>
+            <a:picLocks noChangeAspect="1"/>
+          </p:cNvPicPr>
+          <p:nvPr/>
+        </p:nvPicPr>
+        <p:blipFill>
+          <a:blip r:embed="rId9">
+            <a:extLst>
+              <a:ext uri="{96DAC541-7B7A-43D3-8B79-37D633B846F1}">
+                <asvg:svgBlip xmlns:asvg="http://schemas.microsoft.com/office/drawing/2016/SVG/main" r:embed="rId10"/>
+              </a:ext>
+            </a:extLst>
+          </a:blip>
+          <a:stretch>
+            <a:fillRect/>
+          </a:stretch>
+        </p:blipFill>
+        <p:spPr>
+          <a:xfrm>
+            <a:off x="4558654" y="0"/>
+            <a:ext cx="4585346" cy="2579257"/>
+          </a:xfrm>
+          <a:prstGeom prst="rect">
+            <a:avLst/>
+          </a:prstGeom>
+        </p:spPr>
+      </p:pic>
     </p:spTree>
   </p:cSld>
   <p:clrMapOvr>

</xml_diff>

<commit_message>
Added slide whit name lookup limitations
</commit_message>
<xml_diff>
--- a/Exjobbspresentation.pptx
+++ b/Exjobbspresentation.pptx
@@ -5,29 +5,31 @@
     <p:sldMasterId id="2147483659" r:id="rId1"/>
   </p:sldMasterIdLst>
   <p:notesMasterIdLst>
-    <p:notesMasterId r:id="rId12"/>
+    <p:notesMasterId r:id="rId14"/>
   </p:notesMasterIdLst>
   <p:sldIdLst>
     <p:sldId id="256" r:id="rId2"/>
     <p:sldId id="257" r:id="rId3"/>
     <p:sldId id="258" r:id="rId4"/>
-    <p:sldId id="259" r:id="rId5"/>
-    <p:sldId id="260" r:id="rId6"/>
-    <p:sldId id="261" r:id="rId7"/>
-    <p:sldId id="262" r:id="rId8"/>
-    <p:sldId id="263" r:id="rId9"/>
-    <p:sldId id="264" r:id="rId10"/>
-    <p:sldId id="265" r:id="rId11"/>
+    <p:sldId id="267" r:id="rId5"/>
+    <p:sldId id="259" r:id="rId6"/>
+    <p:sldId id="260" r:id="rId7"/>
+    <p:sldId id="261" r:id="rId8"/>
+    <p:sldId id="266" r:id="rId9"/>
+    <p:sldId id="262" r:id="rId10"/>
+    <p:sldId id="263" r:id="rId11"/>
+    <p:sldId id="264" r:id="rId12"/>
+    <p:sldId id="265" r:id="rId13"/>
   </p:sldIdLst>
   <p:sldSz cx="9144000" cy="5143500" type="screen16x9"/>
   <p:notesSz cx="6858000" cy="9144000"/>
   <p:embeddedFontLst>
     <p:embeddedFont>
       <p:font typeface="Roboto" panose="020B0604020202020204" charset="0"/>
-      <p:regular r:id="rId13"/>
-      <p:bold r:id="rId14"/>
-      <p:italic r:id="rId15"/>
-      <p:boldItalic r:id="rId16"/>
+      <p:regular r:id="rId15"/>
+      <p:bold r:id="rId16"/>
+      <p:italic r:id="rId17"/>
+      <p:boldItalic r:id="rId18"/>
     </p:embeddedFont>
   </p:embeddedFontLst>
   <p:defaultTextStyle>
@@ -8874,1377 +8876,6 @@
   <p:cSld>
     <p:spTree>
       <p:nvGrpSpPr>
-        <p:cNvPr id="1" name="Shape 121"/>
-        <p:cNvGrpSpPr/>
-        <p:nvPr/>
-      </p:nvGrpSpPr>
-      <p:grpSpPr>
-        <a:xfrm>
-          <a:off x="0" y="0"/>
-          <a:ext cx="0" cy="0"/>
-          <a:chOff x="0" y="0"/>
-          <a:chExt cx="0" cy="0"/>
-        </a:xfrm>
-      </p:grpSpPr>
-      <p:sp>
-        <p:nvSpPr>
-          <p:cNvPr id="122" name="Shape 122"/>
-          <p:cNvSpPr txBox="1">
-            <a:spLocks noGrp="1"/>
-          </p:cNvSpPr>
-          <p:nvPr>
-            <p:ph type="title"/>
-          </p:nvPr>
-        </p:nvSpPr>
-        <p:spPr>
-          <a:xfrm>
-            <a:off x="471900" y="738725"/>
-            <a:ext cx="8222100" cy="767700"/>
-          </a:xfrm>
-          <a:prstGeom prst="rect">
-            <a:avLst/>
-          </a:prstGeom>
-        </p:spPr>
-        <p:txBody>
-          <a:bodyPr lIns="91425" tIns="91425" rIns="91425" bIns="91425" anchor="b" anchorCtr="0">
-            <a:noAutofit/>
-          </a:bodyPr>
-          <a:lstStyle/>
-          <a:p>
-            <a:pPr lvl="0">
-              <a:spcBef>
-                <a:spcPts val="0"/>
-              </a:spcBef>
-              <a:buNone/>
-            </a:pPr>
-            <a:r>
-              <a:rPr lang="sv"/>
-              <a:t>Validation/Future work</a:t>
-            </a:r>
-          </a:p>
-        </p:txBody>
-      </p:sp>
-      <p:sp>
-        <p:nvSpPr>
-          <p:cNvPr id="123" name="Shape 123"/>
-          <p:cNvSpPr txBox="1">
-            <a:spLocks noGrp="1"/>
-          </p:cNvSpPr>
-          <p:nvPr>
-            <p:ph type="body" idx="1"/>
-          </p:nvPr>
-        </p:nvSpPr>
-        <p:spPr>
-          <a:xfrm>
-            <a:off x="471900" y="1919075"/>
-            <a:ext cx="8222100" cy="2710200"/>
-          </a:xfrm>
-          <a:prstGeom prst="rect">
-            <a:avLst/>
-          </a:prstGeom>
-        </p:spPr>
-        <p:txBody>
-          <a:bodyPr lIns="91425" tIns="91425" rIns="91425" bIns="91425" anchor="t" anchorCtr="0">
-            <a:noAutofit/>
-          </a:bodyPr>
-          <a:lstStyle/>
-          <a:p>
-            <a:pPr marL="285750" indent="-285750"/>
-            <a:r>
-              <a:rPr lang="sv-SE" dirty="0"/>
-              <a:t>Run testselection in paralell with complete testsuite</a:t>
-            </a:r>
-          </a:p>
-          <a:p>
-            <a:pPr marL="285750" indent="-285750"/>
-            <a:r>
-              <a:rPr lang="sv-SE" dirty="0"/>
-              <a:t>Mutation testing</a:t>
-            </a:r>
-          </a:p>
-          <a:p>
-            <a:pPr marL="285750" indent="-285750"/>
-            <a:r>
-              <a:rPr lang="sv-SE" dirty="0"/>
-              <a:t>Move implementation to instance tree?</a:t>
-            </a:r>
-            <a:endParaRPr dirty="0"/>
-          </a:p>
-        </p:txBody>
-      </p:sp>
-    </p:spTree>
-  </p:cSld>
-  <p:clrMapOvr>
-    <a:masterClrMapping/>
-  </p:clrMapOvr>
-</p:sld>
-</file>
-
-<file path=ppt/slides/slide2.xml><?xml version="1.0" encoding="utf-8"?>
-<p:sld xmlns:a="http://schemas.openxmlformats.org/drawingml/2006/main" xmlns:r="http://schemas.openxmlformats.org/officeDocument/2006/relationships" xmlns:p="http://schemas.openxmlformats.org/presentationml/2006/main">
-  <p:cSld>
-    <p:spTree>
-      <p:nvGrpSpPr>
-        <p:cNvPr id="1" name="Shape 72"/>
-        <p:cNvGrpSpPr/>
-        <p:nvPr/>
-      </p:nvGrpSpPr>
-      <p:grpSpPr>
-        <a:xfrm>
-          <a:off x="0" y="0"/>
-          <a:ext cx="0" cy="0"/>
-          <a:chOff x="0" y="0"/>
-          <a:chExt cx="0" cy="0"/>
-        </a:xfrm>
-      </p:grpSpPr>
-      <p:sp>
-        <p:nvSpPr>
-          <p:cNvPr id="73" name="Shape 73"/>
-          <p:cNvSpPr txBox="1">
-            <a:spLocks noGrp="1"/>
-          </p:cNvSpPr>
-          <p:nvPr>
-            <p:ph type="title"/>
-          </p:nvPr>
-        </p:nvSpPr>
-        <p:spPr>
-          <a:xfrm>
-            <a:off x="0" y="2095050"/>
-            <a:ext cx="3288000" cy="953400"/>
-          </a:xfrm>
-          <a:prstGeom prst="rect">
-            <a:avLst/>
-          </a:prstGeom>
-        </p:spPr>
-        <p:txBody>
-          <a:bodyPr lIns="91425" tIns="91425" rIns="91425" bIns="91425" anchor="ctr" anchorCtr="0">
-            <a:noAutofit/>
-          </a:bodyPr>
-          <a:lstStyle/>
-          <a:p>
-            <a:pPr lvl="0" algn="ctr" rtl="0">
-              <a:spcBef>
-                <a:spcPts val="0"/>
-              </a:spcBef>
-              <a:buNone/>
-            </a:pPr>
-            <a:r>
-              <a:rPr lang="sv"/>
-              <a:t>Safe test selection</a:t>
-            </a:r>
-          </a:p>
-        </p:txBody>
-      </p:sp>
-      <p:pic>
-        <p:nvPicPr>
-          <p:cNvPr id="74" name="Shape 74"/>
-          <p:cNvPicPr preferRelativeResize="0"/>
-          <p:nvPr/>
-        </p:nvPicPr>
-        <p:blipFill>
-          <a:blip r:embed="rId3">
-            <a:alphaModFix/>
-          </a:blip>
-          <a:stretch>
-            <a:fillRect/>
-          </a:stretch>
-        </p:blipFill>
-        <p:spPr>
-          <a:xfrm>
-            <a:off x="4331950" y="1083820"/>
-            <a:ext cx="3830974" cy="2975850"/>
-          </a:xfrm>
-          <a:prstGeom prst="rect">
-            <a:avLst/>
-          </a:prstGeom>
-          <a:noFill/>
-          <a:ln>
-            <a:noFill/>
-          </a:ln>
-        </p:spPr>
-      </p:pic>
-    </p:spTree>
-  </p:cSld>
-  <p:clrMapOvr>
-    <a:masterClrMapping/>
-  </p:clrMapOvr>
-</p:sld>
-</file>
-
-<file path=ppt/slides/slide3.xml><?xml version="1.0" encoding="utf-8"?>
-<p:sld xmlns:a="http://schemas.openxmlformats.org/drawingml/2006/main" xmlns:r="http://schemas.openxmlformats.org/officeDocument/2006/relationships" xmlns:p="http://schemas.openxmlformats.org/presentationml/2006/main">
-  <p:cSld>
-    <p:spTree>
-      <p:nvGrpSpPr>
-        <p:cNvPr id="1" name="Shape 78"/>
-        <p:cNvGrpSpPr/>
-        <p:nvPr/>
-      </p:nvGrpSpPr>
-      <p:grpSpPr>
-        <a:xfrm>
-          <a:off x="0" y="0"/>
-          <a:ext cx="0" cy="0"/>
-          <a:chOff x="0" y="0"/>
-          <a:chExt cx="0" cy="0"/>
-        </a:xfrm>
-      </p:grpSpPr>
-      <p:sp>
-        <p:nvSpPr>
-          <p:cNvPr id="79" name="Shape 79"/>
-          <p:cNvSpPr txBox="1">
-            <a:spLocks noGrp="1"/>
-          </p:cNvSpPr>
-          <p:nvPr>
-            <p:ph type="title"/>
-          </p:nvPr>
-        </p:nvSpPr>
-        <p:spPr>
-          <a:xfrm>
-            <a:off x="98250" y="16350"/>
-            <a:ext cx="8826600" cy="602700"/>
-          </a:xfrm>
-          <a:prstGeom prst="rect">
-            <a:avLst/>
-          </a:prstGeom>
-        </p:spPr>
-        <p:txBody>
-          <a:bodyPr lIns="91425" tIns="91425" rIns="91425" bIns="91425" anchor="ctr" anchorCtr="0">
-            <a:noAutofit/>
-          </a:bodyPr>
-          <a:lstStyle/>
-          <a:p>
-            <a:pPr lvl="0">
-              <a:spcBef>
-                <a:spcPts val="0"/>
-              </a:spcBef>
-              <a:buNone/>
-            </a:pPr>
-            <a:r>
-              <a:rPr lang="sv"/>
-              <a:t>Modelica Bouncing Ball example</a:t>
-            </a:r>
-          </a:p>
-        </p:txBody>
-      </p:sp>
-      <p:pic>
-        <p:nvPicPr>
-          <p:cNvPr id="80" name="Shape 80" descr="BB1.png"/>
-          <p:cNvPicPr preferRelativeResize="0"/>
-          <p:nvPr/>
-        </p:nvPicPr>
-        <p:blipFill>
-          <a:blip r:embed="rId3">
-            <a:alphaModFix/>
-          </a:blip>
-          <a:stretch>
-            <a:fillRect/>
-          </a:stretch>
-        </p:blipFill>
-        <p:spPr>
-          <a:xfrm>
-            <a:off x="4713175" y="1538600"/>
-            <a:ext cx="4806524" cy="3604899"/>
-          </a:xfrm>
-          <a:prstGeom prst="rect">
-            <a:avLst/>
-          </a:prstGeom>
-          <a:noFill/>
-          <a:ln>
-            <a:noFill/>
-          </a:ln>
-        </p:spPr>
-      </p:pic>
-      <p:sp>
-        <p:nvSpPr>
-          <p:cNvPr id="81" name="Shape 81"/>
-          <p:cNvSpPr txBox="1">
-            <a:spLocks noGrp="1"/>
-          </p:cNvSpPr>
-          <p:nvPr>
-            <p:ph type="body" idx="4294967295"/>
-          </p:nvPr>
-        </p:nvSpPr>
-        <p:spPr>
-          <a:xfrm>
-            <a:off x="-1" y="785525"/>
-            <a:ext cx="5473051" cy="4187100"/>
-          </a:xfrm>
-          <a:prstGeom prst="rect">
-            <a:avLst/>
-          </a:prstGeom>
-        </p:spPr>
-        <p:txBody>
-          <a:bodyPr lIns="91425" tIns="91425" rIns="91425" bIns="91425" anchor="t" anchorCtr="0">
-            <a:noAutofit/>
-          </a:bodyPr>
-          <a:lstStyle/>
-          <a:p>
-            <a:pPr lvl="0" rtl="0">
-              <a:lnSpc>
-                <a:spcPct val="115000"/>
-              </a:lnSpc>
-              <a:spcBef>
-                <a:spcPts val="0"/>
-              </a:spcBef>
-              <a:spcAft>
-                <a:spcPts val="0"/>
-              </a:spcAft>
-              <a:buNone/>
-            </a:pPr>
-            <a:r>
-              <a:rPr lang="sv" sz="1200" b="1" dirty="0">
-                <a:solidFill>
-                  <a:srgbClr val="0000FF"/>
-                </a:solidFill>
-                <a:latin typeface="Courier New"/>
-                <a:ea typeface="Courier New"/>
-                <a:cs typeface="Courier New"/>
-                <a:sym typeface="Courier New"/>
-              </a:rPr>
-              <a:t>model</a:t>
-            </a:r>
-            <a:r>
-              <a:rPr lang="sv" sz="1200" dirty="0">
-                <a:solidFill>
-                  <a:srgbClr val="000000"/>
-                </a:solidFill>
-                <a:latin typeface="Courier New"/>
-                <a:ea typeface="Courier New"/>
-                <a:cs typeface="Courier New"/>
-                <a:sym typeface="Courier New"/>
-              </a:rPr>
-              <a:t> BouncingBall </a:t>
-            </a:r>
-            <a:r>
-              <a:rPr lang="sv" sz="1200" dirty="0">
-                <a:solidFill>
-                  <a:srgbClr val="38761D"/>
-                </a:solidFill>
-                <a:latin typeface="Courier New"/>
-                <a:ea typeface="Courier New"/>
-                <a:cs typeface="Courier New"/>
-                <a:sym typeface="Courier New"/>
-              </a:rPr>
-              <a:t>//The 'classic' bouncing ball model</a:t>
-            </a:r>
-          </a:p>
-          <a:p>
-            <a:pPr lvl="0">
-              <a:lnSpc>
-                <a:spcPct val="115000"/>
-              </a:lnSpc>
-              <a:spcBef>
-                <a:spcPts val="0"/>
-              </a:spcBef>
-              <a:spcAft>
-                <a:spcPts val="0"/>
-              </a:spcAft>
-              <a:buNone/>
-            </a:pPr>
-            <a:r>
-              <a:rPr lang="sv" sz="1200" dirty="0">
-                <a:solidFill>
-                  <a:srgbClr val="000000"/>
-                </a:solidFill>
-                <a:latin typeface="Courier New"/>
-                <a:ea typeface="Courier New"/>
-                <a:cs typeface="Courier New"/>
-                <a:sym typeface="Courier New"/>
-              </a:rPr>
-              <a:t>  </a:t>
-            </a:r>
-            <a:r>
-              <a:rPr lang="sv" sz="1200" b="1" dirty="0">
-                <a:solidFill>
-                  <a:srgbClr val="0000FF"/>
-                </a:solidFill>
-                <a:latin typeface="Courier New"/>
-                <a:ea typeface="Courier New"/>
-                <a:cs typeface="Courier New"/>
-                <a:sym typeface="Courier New"/>
-              </a:rPr>
-              <a:t>parameter</a:t>
-            </a:r>
-            <a:r>
-              <a:rPr lang="sv" sz="1200" dirty="0">
-                <a:solidFill>
-                  <a:srgbClr val="000000"/>
-                </a:solidFill>
-                <a:latin typeface="Courier New"/>
-                <a:ea typeface="Courier New"/>
-                <a:cs typeface="Courier New"/>
-                <a:sym typeface="Courier New"/>
-              </a:rPr>
-              <a:t> Real e = 0.8; </a:t>
-            </a:r>
-            <a:r>
-              <a:rPr lang="sv" sz="1200" dirty="0">
-                <a:solidFill>
-                  <a:srgbClr val="38761D"/>
-                </a:solidFill>
-                <a:latin typeface="Courier New"/>
-                <a:ea typeface="Courier New"/>
-                <a:cs typeface="Courier New"/>
-                <a:sym typeface="Courier New"/>
-              </a:rPr>
-              <a:t>//Elasticity coefficient</a:t>
-            </a:r>
-          </a:p>
-          <a:p>
-            <a:pPr lvl="0">
-              <a:lnSpc>
-                <a:spcPct val="115000"/>
-              </a:lnSpc>
-              <a:spcBef>
-                <a:spcPts val="0"/>
-              </a:spcBef>
-              <a:spcAft>
-                <a:spcPts val="0"/>
-              </a:spcAft>
-              <a:buNone/>
-            </a:pPr>
-            <a:r>
-              <a:rPr lang="sv" sz="1200" dirty="0">
-                <a:solidFill>
-                  <a:srgbClr val="000000"/>
-                </a:solidFill>
-                <a:latin typeface="Courier New"/>
-                <a:ea typeface="Courier New"/>
-                <a:cs typeface="Courier New"/>
-                <a:sym typeface="Courier New"/>
-              </a:rPr>
-              <a:t>  </a:t>
-            </a:r>
-            <a:r>
-              <a:rPr lang="sv" sz="1200" b="1" dirty="0">
-                <a:solidFill>
-                  <a:srgbClr val="0000FF"/>
-                </a:solidFill>
-                <a:latin typeface="Courier New"/>
-                <a:ea typeface="Courier New"/>
-                <a:cs typeface="Courier New"/>
-                <a:sym typeface="Courier New"/>
-              </a:rPr>
-              <a:t>parameter</a:t>
-            </a:r>
-            <a:r>
-              <a:rPr lang="sv" sz="1200" dirty="0">
-                <a:solidFill>
-                  <a:srgbClr val="000000"/>
-                </a:solidFill>
-                <a:latin typeface="Courier New"/>
-                <a:ea typeface="Courier New"/>
-                <a:cs typeface="Courier New"/>
-                <a:sym typeface="Courier New"/>
-              </a:rPr>
-              <a:t> Real g = 9.81; </a:t>
-            </a:r>
-            <a:r>
-              <a:rPr lang="sv" sz="1200" dirty="0">
-                <a:solidFill>
-                  <a:srgbClr val="38761D"/>
-                </a:solidFill>
-                <a:latin typeface="Courier New"/>
-                <a:ea typeface="Courier New"/>
-                <a:cs typeface="Courier New"/>
-                <a:sym typeface="Courier New"/>
-              </a:rPr>
-              <a:t>//Acceleration due to gravity</a:t>
-            </a:r>
-          </a:p>
-          <a:p>
-            <a:pPr lvl="0">
-              <a:lnSpc>
-                <a:spcPct val="115000"/>
-              </a:lnSpc>
-              <a:spcBef>
-                <a:spcPts val="0"/>
-              </a:spcBef>
-              <a:spcAft>
-                <a:spcPts val="0"/>
-              </a:spcAft>
-              <a:buNone/>
-            </a:pPr>
-            <a:r>
-              <a:rPr lang="sv" sz="1200" dirty="0">
-                <a:solidFill>
-                  <a:srgbClr val="000000"/>
-                </a:solidFill>
-                <a:latin typeface="Courier New"/>
-                <a:ea typeface="Courier New"/>
-                <a:cs typeface="Courier New"/>
-                <a:sym typeface="Courier New"/>
-              </a:rPr>
-              <a:t>  Height h(start=1); </a:t>
-            </a:r>
-            <a:r>
-              <a:rPr lang="sv" sz="1200" dirty="0">
-                <a:solidFill>
-                  <a:srgbClr val="38761D"/>
-                </a:solidFill>
-                <a:latin typeface="Courier New"/>
-                <a:ea typeface="Courier New"/>
-                <a:cs typeface="Courier New"/>
-                <a:sym typeface="Courier New"/>
-              </a:rPr>
-              <a:t>//Height of the ball</a:t>
-            </a:r>
-          </a:p>
-          <a:p>
-            <a:pPr lvl="0">
-              <a:lnSpc>
-                <a:spcPct val="115000"/>
-              </a:lnSpc>
-              <a:spcBef>
-                <a:spcPts val="0"/>
-              </a:spcBef>
-              <a:spcAft>
-                <a:spcPts val="0"/>
-              </a:spcAft>
-              <a:buNone/>
-            </a:pPr>
-            <a:r>
-              <a:rPr lang="sv" sz="1200" dirty="0">
-                <a:solidFill>
-                  <a:srgbClr val="000000"/>
-                </a:solidFill>
-                <a:latin typeface="Courier New"/>
-                <a:ea typeface="Courier New"/>
-                <a:cs typeface="Courier New"/>
-                <a:sym typeface="Courier New"/>
-              </a:rPr>
-              <a:t>  Velocity v(start=0); </a:t>
-            </a:r>
-            <a:r>
-              <a:rPr lang="sv" sz="1200" dirty="0">
-                <a:solidFill>
-                  <a:srgbClr val="38761D"/>
-                </a:solidFill>
-                <a:latin typeface="Courier New"/>
-                <a:ea typeface="Courier New"/>
-                <a:cs typeface="Courier New"/>
-                <a:sym typeface="Courier New"/>
-              </a:rPr>
-              <a:t>//Velocity of the ball</a:t>
-            </a:r>
-          </a:p>
-          <a:p>
-            <a:pPr lvl="0">
-              <a:lnSpc>
-                <a:spcPct val="115000"/>
-              </a:lnSpc>
-              <a:spcBef>
-                <a:spcPts val="0"/>
-              </a:spcBef>
-              <a:spcAft>
-                <a:spcPts val="0"/>
-              </a:spcAft>
-              <a:buNone/>
-            </a:pPr>
-            <a:r>
-              <a:rPr lang="sv" sz="1200" b="1" dirty="0">
-                <a:solidFill>
-                  <a:srgbClr val="0000FF"/>
-                </a:solidFill>
-                <a:latin typeface="Courier New"/>
-                <a:ea typeface="Courier New"/>
-                <a:cs typeface="Courier New"/>
-                <a:sym typeface="Courier New"/>
-              </a:rPr>
-              <a:t>equation</a:t>
-            </a:r>
-          </a:p>
-          <a:p>
-            <a:pPr lvl="0">
-              <a:lnSpc>
-                <a:spcPct val="115000"/>
-              </a:lnSpc>
-              <a:spcBef>
-                <a:spcPts val="0"/>
-              </a:spcBef>
-              <a:spcAft>
-                <a:spcPts val="0"/>
-              </a:spcAft>
-              <a:buNone/>
-            </a:pPr>
-            <a:r>
-              <a:rPr lang="sv" sz="1200" dirty="0">
-                <a:solidFill>
-                  <a:srgbClr val="000000"/>
-                </a:solidFill>
-                <a:latin typeface="Courier New"/>
-                <a:ea typeface="Courier New"/>
-                <a:cs typeface="Courier New"/>
-                <a:sym typeface="Courier New"/>
-              </a:rPr>
-              <a:t>  </a:t>
-            </a:r>
-            <a:r>
-              <a:rPr lang="sv" sz="1200" b="1" dirty="0">
-                <a:solidFill>
-                  <a:srgbClr val="0000FF"/>
-                </a:solidFill>
-                <a:latin typeface="Courier New"/>
-                <a:ea typeface="Courier New"/>
-                <a:cs typeface="Courier New"/>
-                <a:sym typeface="Courier New"/>
-              </a:rPr>
-              <a:t>der</a:t>
-            </a:r>
-            <a:r>
-              <a:rPr lang="sv" sz="1200" dirty="0">
-                <a:solidFill>
-                  <a:srgbClr val="000000"/>
-                </a:solidFill>
-                <a:latin typeface="Courier New"/>
-                <a:ea typeface="Courier New"/>
-                <a:cs typeface="Courier New"/>
-                <a:sym typeface="Courier New"/>
-              </a:rPr>
-              <a:t>(h) = v; </a:t>
-            </a:r>
-            <a:r>
-              <a:rPr lang="sv" sz="1200" dirty="0">
-                <a:solidFill>
-                  <a:srgbClr val="38761D"/>
-                </a:solidFill>
-                <a:latin typeface="Courier New"/>
-                <a:ea typeface="Courier New"/>
-                <a:cs typeface="Courier New"/>
-                <a:sym typeface="Courier New"/>
-              </a:rPr>
-              <a:t>//Newtons second law</a:t>
-            </a:r>
-          </a:p>
-          <a:p>
-            <a:pPr lvl="0">
-              <a:lnSpc>
-                <a:spcPct val="115000"/>
-              </a:lnSpc>
-              <a:spcBef>
-                <a:spcPts val="0"/>
-              </a:spcBef>
-              <a:spcAft>
-                <a:spcPts val="0"/>
-              </a:spcAft>
-              <a:buNone/>
-            </a:pPr>
-            <a:r>
-              <a:rPr lang="sv" sz="1200" dirty="0">
-                <a:solidFill>
-                  <a:srgbClr val="000000"/>
-                </a:solidFill>
-                <a:latin typeface="Courier New"/>
-                <a:ea typeface="Courier New"/>
-                <a:cs typeface="Courier New"/>
-                <a:sym typeface="Courier New"/>
-              </a:rPr>
-              <a:t>  </a:t>
-            </a:r>
-            <a:r>
-              <a:rPr lang="sv" sz="1200" b="1" dirty="0">
-                <a:solidFill>
-                  <a:srgbClr val="0000FF"/>
-                </a:solidFill>
-                <a:latin typeface="Courier New"/>
-                <a:ea typeface="Courier New"/>
-                <a:cs typeface="Courier New"/>
-                <a:sym typeface="Courier New"/>
-              </a:rPr>
-              <a:t>der</a:t>
-            </a:r>
-            <a:r>
-              <a:rPr lang="sv" sz="1200" dirty="0">
-                <a:solidFill>
-                  <a:srgbClr val="000000"/>
-                </a:solidFill>
-                <a:latin typeface="Courier New"/>
-                <a:ea typeface="Courier New"/>
-                <a:cs typeface="Courier New"/>
-                <a:sym typeface="Courier New"/>
-              </a:rPr>
-              <a:t>(v) = -g;</a:t>
-            </a:r>
-          </a:p>
-          <a:p>
-            <a:pPr lvl="0">
-              <a:lnSpc>
-                <a:spcPct val="115000"/>
-              </a:lnSpc>
-              <a:spcBef>
-                <a:spcPts val="0"/>
-              </a:spcBef>
-              <a:spcAft>
-                <a:spcPts val="0"/>
-              </a:spcAft>
-              <a:buNone/>
-            </a:pPr>
-            <a:r>
-              <a:rPr lang="sv" sz="1200" dirty="0">
-                <a:solidFill>
-                  <a:srgbClr val="000000"/>
-                </a:solidFill>
-                <a:latin typeface="Courier New"/>
-                <a:ea typeface="Courier New"/>
-                <a:cs typeface="Courier New"/>
-                <a:sym typeface="Courier New"/>
-              </a:rPr>
-              <a:t>  </a:t>
-            </a:r>
-            <a:r>
-              <a:rPr lang="sv" sz="1200" b="1" dirty="0">
-                <a:solidFill>
-                  <a:srgbClr val="0000FF"/>
-                </a:solidFill>
-                <a:latin typeface="Courier New"/>
-                <a:ea typeface="Courier New"/>
-                <a:cs typeface="Courier New"/>
-                <a:sym typeface="Courier New"/>
-              </a:rPr>
-              <a:t>when</a:t>
-            </a:r>
-            <a:r>
-              <a:rPr lang="sv" sz="1200" dirty="0">
-                <a:solidFill>
-                  <a:srgbClr val="000000"/>
-                </a:solidFill>
-                <a:latin typeface="Courier New"/>
-                <a:ea typeface="Courier New"/>
-                <a:cs typeface="Courier New"/>
-                <a:sym typeface="Courier New"/>
-              </a:rPr>
-              <a:t> h &lt;= 0 </a:t>
-            </a:r>
-            <a:r>
-              <a:rPr lang="sv" sz="1200" b="1" dirty="0">
-                <a:solidFill>
-                  <a:srgbClr val="0000FF"/>
-                </a:solidFill>
-                <a:latin typeface="Courier New"/>
-                <a:ea typeface="Courier New"/>
-                <a:cs typeface="Courier New"/>
-                <a:sym typeface="Courier New"/>
-              </a:rPr>
-              <a:t>then</a:t>
-            </a:r>
-          </a:p>
-          <a:p>
-            <a:pPr lvl="0">
-              <a:lnSpc>
-                <a:spcPct val="115000"/>
-              </a:lnSpc>
-              <a:spcBef>
-                <a:spcPts val="0"/>
-              </a:spcBef>
-              <a:spcAft>
-                <a:spcPts val="0"/>
-              </a:spcAft>
-              <a:buNone/>
-            </a:pPr>
-            <a:r>
-              <a:rPr lang="sv" sz="1200" dirty="0">
-                <a:solidFill>
-                  <a:srgbClr val="000000"/>
-                </a:solidFill>
-                <a:latin typeface="Courier New"/>
-                <a:ea typeface="Courier New"/>
-                <a:cs typeface="Courier New"/>
-                <a:sym typeface="Courier New"/>
-              </a:rPr>
-              <a:t>    reinit(v, -e*pre(v)); </a:t>
-            </a:r>
-            <a:r>
-              <a:rPr lang="sv" sz="1200" dirty="0">
-                <a:solidFill>
-                  <a:srgbClr val="38761D"/>
-                </a:solidFill>
-                <a:latin typeface="Courier New"/>
-                <a:ea typeface="Courier New"/>
-                <a:cs typeface="Courier New"/>
-                <a:sym typeface="Courier New"/>
-              </a:rPr>
-              <a:t>//Set velocity after bounce</a:t>
-            </a:r>
-          </a:p>
-          <a:p>
-            <a:pPr lvl="0">
-              <a:lnSpc>
-                <a:spcPct val="115000"/>
-              </a:lnSpc>
-              <a:spcBef>
-                <a:spcPts val="0"/>
-              </a:spcBef>
-              <a:spcAft>
-                <a:spcPts val="0"/>
-              </a:spcAft>
-              <a:buNone/>
-            </a:pPr>
-            <a:r>
-              <a:rPr lang="sv" sz="1200" dirty="0">
-                <a:solidFill>
-                  <a:srgbClr val="000000"/>
-                </a:solidFill>
-                <a:latin typeface="Courier New"/>
-                <a:ea typeface="Courier New"/>
-                <a:cs typeface="Courier New"/>
-                <a:sym typeface="Courier New"/>
-              </a:rPr>
-              <a:t>  </a:t>
-            </a:r>
-            <a:r>
-              <a:rPr lang="sv" sz="1200" b="1" dirty="0">
-                <a:solidFill>
-                  <a:srgbClr val="0000FF"/>
-                </a:solidFill>
-                <a:latin typeface="Courier New"/>
-                <a:ea typeface="Courier New"/>
-                <a:cs typeface="Courier New"/>
-                <a:sym typeface="Courier New"/>
-              </a:rPr>
-              <a:t>end when</a:t>
-            </a:r>
-            <a:r>
-              <a:rPr lang="sv" sz="1200" dirty="0">
-                <a:solidFill>
-                  <a:srgbClr val="000000"/>
-                </a:solidFill>
-                <a:latin typeface="Courier New"/>
-                <a:ea typeface="Courier New"/>
-                <a:cs typeface="Courier New"/>
-                <a:sym typeface="Courier New"/>
-              </a:rPr>
-              <a:t>;</a:t>
-            </a:r>
-          </a:p>
-          <a:p>
-            <a:pPr lvl="0">
-              <a:lnSpc>
-                <a:spcPct val="115000"/>
-              </a:lnSpc>
-              <a:spcBef>
-                <a:spcPts val="0"/>
-              </a:spcBef>
-              <a:spcAft>
-                <a:spcPts val="0"/>
-              </a:spcAft>
-              <a:buNone/>
-            </a:pPr>
-            <a:r>
-              <a:rPr lang="sv" sz="1200" b="1" dirty="0">
-                <a:solidFill>
-                  <a:srgbClr val="0000FF"/>
-                </a:solidFill>
-                <a:latin typeface="Courier New"/>
-                <a:ea typeface="Courier New"/>
-                <a:cs typeface="Courier New"/>
-                <a:sym typeface="Courier New"/>
-              </a:rPr>
-              <a:t>end</a:t>
-            </a:r>
-            <a:r>
-              <a:rPr lang="sv" sz="1200" dirty="0">
-                <a:solidFill>
-                  <a:srgbClr val="000000"/>
-                </a:solidFill>
-                <a:latin typeface="Courier New"/>
-                <a:ea typeface="Courier New"/>
-                <a:cs typeface="Courier New"/>
-                <a:sym typeface="Courier New"/>
-              </a:rPr>
-              <a:t> BouncingBall;</a:t>
-            </a:r>
-          </a:p>
-          <a:p>
-            <a:pPr lvl="0">
-              <a:spcBef>
-                <a:spcPts val="0"/>
-              </a:spcBef>
-              <a:buNone/>
-            </a:pPr>
-            <a:endParaRPr dirty="0"/>
-          </a:p>
-        </p:txBody>
-      </p:sp>
-    </p:spTree>
-  </p:cSld>
-  <p:clrMapOvr>
-    <a:masterClrMapping/>
-  </p:clrMapOvr>
-</p:sld>
-</file>
-
-<file path=ppt/slides/slide4.xml><?xml version="1.0" encoding="utf-8"?>
-<p:sld xmlns:a="http://schemas.openxmlformats.org/drawingml/2006/main" xmlns:r="http://schemas.openxmlformats.org/officeDocument/2006/relationships" xmlns:p="http://schemas.openxmlformats.org/presentationml/2006/main">
-  <p:cSld>
-    <p:spTree>
-      <p:nvGrpSpPr>
-        <p:cNvPr id="1" name="Shape 85"/>
-        <p:cNvGrpSpPr/>
-        <p:nvPr/>
-      </p:nvGrpSpPr>
-      <p:grpSpPr>
-        <a:xfrm>
-          <a:off x="0" y="0"/>
-          <a:ext cx="0" cy="0"/>
-          <a:chOff x="0" y="0"/>
-          <a:chExt cx="0" cy="0"/>
-        </a:xfrm>
-      </p:grpSpPr>
-      <p:sp>
-        <p:nvSpPr>
-          <p:cNvPr id="86" name="Shape 86"/>
-          <p:cNvSpPr txBox="1">
-            <a:spLocks noGrp="1"/>
-          </p:cNvSpPr>
-          <p:nvPr>
-            <p:ph type="title"/>
-          </p:nvPr>
-        </p:nvSpPr>
-        <p:spPr>
-          <a:xfrm>
-            <a:off x="471900" y="738725"/>
-            <a:ext cx="8222100" cy="767700"/>
-          </a:xfrm>
-          <a:prstGeom prst="rect">
-            <a:avLst/>
-          </a:prstGeom>
-        </p:spPr>
-        <p:txBody>
-          <a:bodyPr lIns="91425" tIns="91425" rIns="91425" bIns="91425" anchor="b" anchorCtr="0">
-            <a:noAutofit/>
-          </a:bodyPr>
-          <a:lstStyle/>
-          <a:p>
-            <a:pPr lvl="0">
-              <a:spcBef>
-                <a:spcPts val="0"/>
-              </a:spcBef>
-              <a:buNone/>
-            </a:pPr>
-            <a:r>
-              <a:rPr lang="sv" dirty="0"/>
-              <a:t>O</a:t>
-            </a:r>
-            <a:r>
-              <a:rPr lang="en-US" dirty="0"/>
-              <a:t>PTIMICA Compiler Toolkit and</a:t>
-            </a:r>
-            <a:r>
-              <a:rPr lang="sv" dirty="0"/>
-              <a:t> JModelica.org</a:t>
-            </a:r>
-          </a:p>
-        </p:txBody>
-      </p:sp>
-      <p:sp>
-        <p:nvSpPr>
-          <p:cNvPr id="87" name="Shape 87"/>
-          <p:cNvSpPr txBox="1">
-            <a:spLocks noGrp="1"/>
-          </p:cNvSpPr>
-          <p:nvPr>
-            <p:ph type="body" idx="1"/>
-          </p:nvPr>
-        </p:nvSpPr>
-        <p:spPr>
-          <a:xfrm>
-            <a:off x="471900" y="1919075"/>
-            <a:ext cx="8222100" cy="2710200"/>
-          </a:xfrm>
-          <a:prstGeom prst="rect">
-            <a:avLst/>
-          </a:prstGeom>
-        </p:spPr>
-        <p:txBody>
-          <a:bodyPr lIns="91425" tIns="91425" rIns="91425" bIns="91425" anchor="t" anchorCtr="0">
-            <a:noAutofit/>
-          </a:bodyPr>
-          <a:lstStyle/>
-          <a:p>
-            <a:pPr lvl="0">
-              <a:spcBef>
-                <a:spcPts val="0"/>
-              </a:spcBef>
-              <a:buNone/>
-            </a:pPr>
-            <a:endParaRPr/>
-          </a:p>
-        </p:txBody>
-      </p:sp>
-    </p:spTree>
-  </p:cSld>
-  <p:clrMapOvr>
-    <a:masterClrMapping/>
-  </p:clrMapOvr>
-</p:sld>
-</file>
-
-<file path=ppt/slides/slide5.xml><?xml version="1.0" encoding="utf-8"?>
-<p:sld xmlns:a="http://schemas.openxmlformats.org/drawingml/2006/main" xmlns:r="http://schemas.openxmlformats.org/officeDocument/2006/relationships" xmlns:p="http://schemas.openxmlformats.org/presentationml/2006/main">
-  <p:cSld>
-    <p:spTree>
-      <p:nvGrpSpPr>
-        <p:cNvPr id="1" name="Shape 91"/>
-        <p:cNvGrpSpPr/>
-        <p:nvPr/>
-      </p:nvGrpSpPr>
-      <p:grpSpPr>
-        <a:xfrm>
-          <a:off x="0" y="0"/>
-          <a:ext cx="0" cy="0"/>
-          <a:chOff x="0" y="0"/>
-          <a:chExt cx="0" cy="0"/>
-        </a:xfrm>
-      </p:grpSpPr>
-      <p:sp>
-        <p:nvSpPr>
-          <p:cNvPr id="92" name="Shape 92"/>
-          <p:cNvSpPr txBox="1">
-            <a:spLocks noGrp="1"/>
-          </p:cNvSpPr>
-          <p:nvPr>
-            <p:ph type="title"/>
-          </p:nvPr>
-        </p:nvSpPr>
-        <p:spPr>
-          <a:xfrm>
-            <a:off x="471900" y="738725"/>
-            <a:ext cx="8222100" cy="767700"/>
-          </a:xfrm>
-          <a:prstGeom prst="rect">
-            <a:avLst/>
-          </a:prstGeom>
-        </p:spPr>
-        <p:txBody>
-          <a:bodyPr lIns="91425" tIns="91425" rIns="91425" bIns="91425" anchor="b" anchorCtr="0">
-            <a:noAutofit/>
-          </a:bodyPr>
-          <a:lstStyle/>
-          <a:p>
-            <a:pPr lvl="0">
-              <a:spcBef>
-                <a:spcPts val="0"/>
-              </a:spcBef>
-              <a:buNone/>
-            </a:pPr>
-            <a:r>
-              <a:rPr lang="en-US" dirty="0"/>
-              <a:t>Model Testing Toolkit</a:t>
-            </a:r>
-            <a:endParaRPr lang="sv" dirty="0"/>
-          </a:p>
-        </p:txBody>
-      </p:sp>
-      <p:sp>
-        <p:nvSpPr>
-          <p:cNvPr id="93" name="Shape 93"/>
-          <p:cNvSpPr txBox="1">
-            <a:spLocks noGrp="1"/>
-          </p:cNvSpPr>
-          <p:nvPr>
-            <p:ph type="body" idx="1"/>
-          </p:nvPr>
-        </p:nvSpPr>
-        <p:spPr>
-          <a:xfrm>
-            <a:off x="471900" y="1919075"/>
-            <a:ext cx="8222100" cy="2710200"/>
-          </a:xfrm>
-          <a:prstGeom prst="rect">
-            <a:avLst/>
-          </a:prstGeom>
-        </p:spPr>
-        <p:txBody>
-          <a:bodyPr lIns="91425" tIns="91425" rIns="91425" bIns="91425" anchor="t" anchorCtr="0">
-            <a:noAutofit/>
-          </a:bodyPr>
-          <a:lstStyle/>
-          <a:p>
-            <a:pPr lvl="0">
-              <a:spcBef>
-                <a:spcPts val="0"/>
-              </a:spcBef>
-              <a:buNone/>
-            </a:pPr>
-            <a:endParaRPr dirty="0"/>
-          </a:p>
-        </p:txBody>
-      </p:sp>
-      <p:graphicFrame>
-        <p:nvGraphicFramePr>
-          <p:cNvPr id="2" name="Diagram 1">
-            <a:extLst>
-              <a:ext uri="{FF2B5EF4-FFF2-40B4-BE49-F238E27FC236}">
-                <a16:creationId xmlns:a16="http://schemas.microsoft.com/office/drawing/2014/main" id="{4A771E42-F786-4BB0-97DF-833B5A14CE91}"/>
-              </a:ext>
-            </a:extLst>
-          </p:cNvPr>
-          <p:cNvGraphicFramePr/>
-          <p:nvPr>
-            <p:extLst>
-              <p:ext uri="{D42A27DB-BD31-4B8C-83A1-F6EECF244321}">
-                <p14:modId xmlns:p14="http://schemas.microsoft.com/office/powerpoint/2010/main" val="2312780197"/>
-              </p:ext>
-            </p:extLst>
-          </p:nvPr>
-        </p:nvGraphicFramePr>
-        <p:xfrm>
-          <a:off x="1524000" y="539750"/>
-          <a:ext cx="6096000" cy="4064000"/>
-        </p:xfrm>
-        <a:graphic>
-          <a:graphicData uri="http://schemas.openxmlformats.org/drawingml/2006/diagram">
-            <dgm:relIds xmlns:dgm="http://schemas.openxmlformats.org/drawingml/2006/diagram" xmlns:r="http://schemas.openxmlformats.org/officeDocument/2006/relationships" r:dm="rId3" r:lo="rId4" r:qs="rId5" r:cs="rId6"/>
-          </a:graphicData>
-        </a:graphic>
-      </p:graphicFrame>
-    </p:spTree>
-  </p:cSld>
-  <p:clrMapOvr>
-    <a:masterClrMapping/>
-  </p:clrMapOvr>
-</p:sld>
-</file>
-
-<file path=ppt/slides/slide6.xml><?xml version="1.0" encoding="utf-8"?>
-<p:sld xmlns:a="http://schemas.openxmlformats.org/drawingml/2006/main" xmlns:r="http://schemas.openxmlformats.org/officeDocument/2006/relationships" xmlns:p="http://schemas.openxmlformats.org/presentationml/2006/main">
-  <p:cSld>
-    <p:spTree>
-      <p:nvGrpSpPr>
-        <p:cNvPr id="1" name="Shape 97"/>
-        <p:cNvGrpSpPr/>
-        <p:nvPr/>
-      </p:nvGrpSpPr>
-      <p:grpSpPr>
-        <a:xfrm>
-          <a:off x="0" y="0"/>
-          <a:ext cx="0" cy="0"/>
-          <a:chOff x="0" y="0"/>
-          <a:chExt cx="0" cy="0"/>
-        </a:xfrm>
-      </p:grpSpPr>
-      <p:sp>
-        <p:nvSpPr>
-          <p:cNvPr id="98" name="Shape 98"/>
-          <p:cNvSpPr txBox="1">
-            <a:spLocks noGrp="1"/>
-          </p:cNvSpPr>
-          <p:nvPr>
-            <p:ph type="title"/>
-          </p:nvPr>
-        </p:nvSpPr>
-        <p:spPr>
-          <a:prstGeom prst="rect">
-            <a:avLst/>
-          </a:prstGeom>
-        </p:spPr>
-        <p:txBody>
-          <a:bodyPr lIns="91425" tIns="91425" rIns="91425" bIns="91425" anchor="b" anchorCtr="0">
-            <a:noAutofit/>
-          </a:bodyPr>
-          <a:lstStyle/>
-          <a:p>
-            <a:pPr lvl="0">
-              <a:spcBef>
-                <a:spcPts val="0"/>
-              </a:spcBef>
-              <a:buNone/>
-            </a:pPr>
-            <a:r>
-              <a:rPr lang="en-US" dirty="0"/>
-              <a:t>Dependency rules</a:t>
-            </a:r>
-            <a:endParaRPr lang="sv" dirty="0"/>
-          </a:p>
-        </p:txBody>
-      </p:sp>
-      <p:sp>
-        <p:nvSpPr>
-          <p:cNvPr id="99" name="Shape 99"/>
-          <p:cNvSpPr txBox="1">
-            <a:spLocks noGrp="1"/>
-          </p:cNvSpPr>
-          <p:nvPr>
-            <p:ph type="body" idx="4294967295"/>
-          </p:nvPr>
-        </p:nvSpPr>
-        <p:spPr>
-          <a:xfrm>
-            <a:off x="166861" y="619050"/>
-            <a:ext cx="8977139" cy="4449357"/>
-          </a:xfrm>
-          <a:prstGeom prst="rect">
-            <a:avLst/>
-          </a:prstGeom>
-        </p:spPr>
-        <p:txBody>
-          <a:bodyPr lIns="91425" tIns="91425" rIns="91425" bIns="91425" anchor="t" anchorCtr="0">
-            <a:noAutofit/>
-          </a:bodyPr>
-          <a:lstStyle/>
-          <a:p>
-            <a:pPr marL="342900" lvl="0" indent="-342900">
-              <a:buFont typeface="+mj-lt"/>
-              <a:buAutoNum type="arabicPeriod"/>
-            </a:pPr>
-            <a:r>
-              <a:rPr lang="en-US" dirty="0"/>
-              <a:t>A class depends on all classes referenced by resolvable accesses within it, not including accesses within paths.</a:t>
-            </a:r>
-          </a:p>
-          <a:p>
-            <a:pPr marL="342900" lvl="0" indent="-342900">
-              <a:buFont typeface="+mj-lt"/>
-              <a:buAutoNum type="arabicPeriod"/>
-            </a:pPr>
-            <a:r>
-              <a:rPr lang="en-US" dirty="0"/>
-              <a:t>A class depends on its enclosing class.</a:t>
-            </a:r>
-          </a:p>
-          <a:p>
-            <a:pPr marL="342900" lvl="0" indent="-342900">
-              <a:buFont typeface="+mj-lt"/>
-              <a:buAutoNum type="arabicPeriod"/>
-            </a:pPr>
-            <a:r>
-              <a:rPr lang="en-US" dirty="0"/>
-              <a:t>A class depends on all classes referenced by access paths within it. A unresolvable access can still contain resolvable accesses within its path.</a:t>
-            </a:r>
-          </a:p>
-          <a:p>
-            <a:pPr marL="342900" lvl="0" indent="-342900">
-              <a:buFont typeface="+mj-lt"/>
-              <a:buAutoNum type="arabicPeriod"/>
-            </a:pPr>
-            <a:r>
-              <a:rPr lang="en-US" dirty="0"/>
-              <a:t>A class depends on all classes enclosed by an accessed class. This does not include access within paths but if an access is not resolvable, the last resolvable access in the path will be used instead. For example, class A contains an access to class B, and B contains the class C, then A will depend on C. Furthermore, if class C contains the class D, A will depend on D as well.</a:t>
-            </a:r>
-          </a:p>
-          <a:p>
-            <a:pPr marL="342900" lvl="0" indent="-342900">
-              <a:buFont typeface="+mj-lt"/>
-              <a:buAutoNum type="arabicPeriod"/>
-            </a:pPr>
-            <a:r>
-              <a:rPr lang="en-US" dirty="0"/>
-              <a:t>Exception to Rule 4: Rule 4 is not applicable to import statements.</a:t>
-            </a:r>
-          </a:p>
-          <a:p>
-            <a:pPr marL="342900" lvl="0" indent="-342900">
-              <a:buFont typeface="+mj-lt"/>
-              <a:buAutoNum type="arabicPeriod"/>
-            </a:pPr>
-            <a:endParaRPr dirty="0"/>
-          </a:p>
-        </p:txBody>
-      </p:sp>
-    </p:spTree>
-  </p:cSld>
-  <p:clrMapOvr>
-    <a:masterClrMapping/>
-  </p:clrMapOvr>
-</p:sld>
-</file>
-
-<file path=ppt/slides/slide7.xml><?xml version="1.0" encoding="utf-8"?>
-<p:sld xmlns:a="http://schemas.openxmlformats.org/drawingml/2006/main" xmlns:r="http://schemas.openxmlformats.org/officeDocument/2006/relationships" xmlns:p="http://schemas.openxmlformats.org/presentationml/2006/main">
-  <p:cSld>
-    <p:spTree>
-      <p:nvGrpSpPr>
-        <p:cNvPr id="1" name="Shape 103"/>
-        <p:cNvGrpSpPr/>
-        <p:nvPr/>
-      </p:nvGrpSpPr>
-      <p:grpSpPr>
-        <a:xfrm>
-          <a:off x="0" y="0"/>
-          <a:ext cx="0" cy="0"/>
-          <a:chOff x="0" y="0"/>
-          <a:chExt cx="0" cy="0"/>
-        </a:xfrm>
-      </p:grpSpPr>
-      <p:sp>
-        <p:nvSpPr>
-          <p:cNvPr id="104" name="Shape 104"/>
-          <p:cNvSpPr txBox="1">
-            <a:spLocks noGrp="1"/>
-          </p:cNvSpPr>
-          <p:nvPr>
-            <p:ph type="title"/>
-          </p:nvPr>
-        </p:nvSpPr>
-        <p:spPr>
-          <a:xfrm>
-            <a:off x="0" y="2095050"/>
-            <a:ext cx="3279000" cy="953400"/>
-          </a:xfrm>
-          <a:prstGeom prst="rect">
-            <a:avLst/>
-          </a:prstGeom>
-        </p:spPr>
-        <p:txBody>
-          <a:bodyPr lIns="91425" tIns="91425" rIns="91425" bIns="91425" anchor="ctr" anchorCtr="0">
-            <a:noAutofit/>
-          </a:bodyPr>
-          <a:lstStyle/>
-          <a:p>
-            <a:pPr lvl="0" algn="ctr" rtl="0">
-              <a:spcBef>
-                <a:spcPts val="0"/>
-              </a:spcBef>
-              <a:buNone/>
-            </a:pPr>
-            <a:r>
-              <a:rPr lang="sv"/>
-              <a:t>Added functionality in GUI</a:t>
-            </a:r>
-          </a:p>
-        </p:txBody>
-      </p:sp>
-      <p:pic>
-        <p:nvPicPr>
-          <p:cNvPr id="105" name="Shape 105" descr="MTT_Capture.PNG"/>
-          <p:cNvPicPr preferRelativeResize="0"/>
-          <p:nvPr/>
-        </p:nvPicPr>
-        <p:blipFill>
-          <a:blip r:embed="rId3">
-            <a:alphaModFix/>
-          </a:blip>
-          <a:stretch>
-            <a:fillRect/>
-          </a:stretch>
-        </p:blipFill>
-        <p:spPr>
-          <a:xfrm>
-            <a:off x="3405077" y="152400"/>
-            <a:ext cx="5570073" cy="4838698"/>
-          </a:xfrm>
-          <a:prstGeom prst="rect">
-            <a:avLst/>
-          </a:prstGeom>
-          <a:noFill/>
-          <a:ln>
-            <a:noFill/>
-          </a:ln>
-        </p:spPr>
-      </p:pic>
-    </p:spTree>
-  </p:cSld>
-  <p:clrMapOvr>
-    <a:masterClrMapping/>
-  </p:clrMapOvr>
-</p:sld>
-</file>
-
-<file path=ppt/slides/slide8.xml><?xml version="1.0" encoding="utf-8"?>
-<p:sld xmlns:a="http://schemas.openxmlformats.org/drawingml/2006/main" xmlns:r="http://schemas.openxmlformats.org/officeDocument/2006/relationships" xmlns:p="http://schemas.openxmlformats.org/presentationml/2006/main">
-  <p:cSld>
-    <p:spTree>
-      <p:nvGrpSpPr>
         <p:cNvPr id="1" name="Shape 109"/>
         <p:cNvGrpSpPr/>
         <p:nvPr/>
@@ -10482,7 +9113,7 @@
 </p:sld>
 </file>
 
-<file path=ppt/slides/slide9.xml><?xml version="1.0" encoding="utf-8"?>
+<file path=ppt/slides/slide11.xml><?xml version="1.0" encoding="utf-8"?>
 <p:sld xmlns:a="http://schemas.openxmlformats.org/drawingml/2006/main" xmlns:r="http://schemas.openxmlformats.org/officeDocument/2006/relationships" xmlns:p="http://schemas.openxmlformats.org/presentationml/2006/main">
   <p:cSld>
     <p:spTree>
@@ -10572,6 +9203,1826 @@
           </a:p>
         </p:txBody>
       </p:sp>
+    </p:spTree>
+  </p:cSld>
+  <p:clrMapOvr>
+    <a:masterClrMapping/>
+  </p:clrMapOvr>
+</p:sld>
+</file>
+
+<file path=ppt/slides/slide12.xml><?xml version="1.0" encoding="utf-8"?>
+<p:sld xmlns:a="http://schemas.openxmlformats.org/drawingml/2006/main" xmlns:r="http://schemas.openxmlformats.org/officeDocument/2006/relationships" xmlns:p="http://schemas.openxmlformats.org/presentationml/2006/main">
+  <p:cSld>
+    <p:spTree>
+      <p:nvGrpSpPr>
+        <p:cNvPr id="1" name="Shape 121"/>
+        <p:cNvGrpSpPr/>
+        <p:nvPr/>
+      </p:nvGrpSpPr>
+      <p:grpSpPr>
+        <a:xfrm>
+          <a:off x="0" y="0"/>
+          <a:ext cx="0" cy="0"/>
+          <a:chOff x="0" y="0"/>
+          <a:chExt cx="0" cy="0"/>
+        </a:xfrm>
+      </p:grpSpPr>
+      <p:sp>
+        <p:nvSpPr>
+          <p:cNvPr id="122" name="Shape 122"/>
+          <p:cNvSpPr txBox="1">
+            <a:spLocks noGrp="1"/>
+          </p:cNvSpPr>
+          <p:nvPr>
+            <p:ph type="title"/>
+          </p:nvPr>
+        </p:nvSpPr>
+        <p:spPr>
+          <a:xfrm>
+            <a:off x="471900" y="738725"/>
+            <a:ext cx="8222100" cy="767700"/>
+          </a:xfrm>
+          <a:prstGeom prst="rect">
+            <a:avLst/>
+          </a:prstGeom>
+        </p:spPr>
+        <p:txBody>
+          <a:bodyPr lIns="91425" tIns="91425" rIns="91425" bIns="91425" anchor="b" anchorCtr="0">
+            <a:noAutofit/>
+          </a:bodyPr>
+          <a:lstStyle/>
+          <a:p>
+            <a:pPr lvl="0">
+              <a:spcBef>
+                <a:spcPts val="0"/>
+              </a:spcBef>
+              <a:buNone/>
+            </a:pPr>
+            <a:r>
+              <a:rPr lang="sv"/>
+              <a:t>Validation/Future work</a:t>
+            </a:r>
+          </a:p>
+        </p:txBody>
+      </p:sp>
+      <p:sp>
+        <p:nvSpPr>
+          <p:cNvPr id="123" name="Shape 123"/>
+          <p:cNvSpPr txBox="1">
+            <a:spLocks noGrp="1"/>
+          </p:cNvSpPr>
+          <p:nvPr>
+            <p:ph type="body" idx="1"/>
+          </p:nvPr>
+        </p:nvSpPr>
+        <p:spPr>
+          <a:xfrm>
+            <a:off x="471900" y="1919075"/>
+            <a:ext cx="8222100" cy="2710200"/>
+          </a:xfrm>
+          <a:prstGeom prst="rect">
+            <a:avLst/>
+          </a:prstGeom>
+        </p:spPr>
+        <p:txBody>
+          <a:bodyPr lIns="91425" tIns="91425" rIns="91425" bIns="91425" anchor="t" anchorCtr="0">
+            <a:noAutofit/>
+          </a:bodyPr>
+          <a:lstStyle/>
+          <a:p>
+            <a:pPr marL="285750" indent="-285750"/>
+            <a:r>
+              <a:rPr lang="sv-SE" dirty="0"/>
+              <a:t>Run testselection in paralell with complete testsuite</a:t>
+            </a:r>
+          </a:p>
+          <a:p>
+            <a:pPr marL="285750" indent="-285750"/>
+            <a:r>
+              <a:rPr lang="sv-SE" dirty="0"/>
+              <a:t>Mutation testing</a:t>
+            </a:r>
+          </a:p>
+          <a:p>
+            <a:pPr marL="285750" indent="-285750"/>
+            <a:r>
+              <a:rPr lang="sv-SE" dirty="0"/>
+              <a:t>Move implementation to instance tree?</a:t>
+            </a:r>
+            <a:endParaRPr dirty="0"/>
+          </a:p>
+        </p:txBody>
+      </p:sp>
+    </p:spTree>
+  </p:cSld>
+  <p:clrMapOvr>
+    <a:masterClrMapping/>
+  </p:clrMapOvr>
+</p:sld>
+</file>
+
+<file path=ppt/slides/slide2.xml><?xml version="1.0" encoding="utf-8"?>
+<p:sld xmlns:a="http://schemas.openxmlformats.org/drawingml/2006/main" xmlns:r="http://schemas.openxmlformats.org/officeDocument/2006/relationships" xmlns:p="http://schemas.openxmlformats.org/presentationml/2006/main">
+  <p:cSld>
+    <p:spTree>
+      <p:nvGrpSpPr>
+        <p:cNvPr id="1" name="Shape 72"/>
+        <p:cNvGrpSpPr/>
+        <p:nvPr/>
+      </p:nvGrpSpPr>
+      <p:grpSpPr>
+        <a:xfrm>
+          <a:off x="0" y="0"/>
+          <a:ext cx="0" cy="0"/>
+          <a:chOff x="0" y="0"/>
+          <a:chExt cx="0" cy="0"/>
+        </a:xfrm>
+      </p:grpSpPr>
+      <p:sp>
+        <p:nvSpPr>
+          <p:cNvPr id="73" name="Shape 73"/>
+          <p:cNvSpPr txBox="1">
+            <a:spLocks noGrp="1"/>
+          </p:cNvSpPr>
+          <p:nvPr>
+            <p:ph type="title"/>
+          </p:nvPr>
+        </p:nvSpPr>
+        <p:spPr>
+          <a:xfrm>
+            <a:off x="0" y="2095050"/>
+            <a:ext cx="3288000" cy="953400"/>
+          </a:xfrm>
+          <a:prstGeom prst="rect">
+            <a:avLst/>
+          </a:prstGeom>
+        </p:spPr>
+        <p:txBody>
+          <a:bodyPr lIns="91425" tIns="91425" rIns="91425" bIns="91425" anchor="ctr" anchorCtr="0">
+            <a:noAutofit/>
+          </a:bodyPr>
+          <a:lstStyle/>
+          <a:p>
+            <a:pPr lvl="0" algn="ctr" rtl="0">
+              <a:spcBef>
+                <a:spcPts val="0"/>
+              </a:spcBef>
+              <a:buNone/>
+            </a:pPr>
+            <a:r>
+              <a:rPr lang="sv"/>
+              <a:t>Safe test selection</a:t>
+            </a:r>
+          </a:p>
+        </p:txBody>
+      </p:sp>
+      <p:pic>
+        <p:nvPicPr>
+          <p:cNvPr id="74" name="Shape 74"/>
+          <p:cNvPicPr preferRelativeResize="0"/>
+          <p:nvPr/>
+        </p:nvPicPr>
+        <p:blipFill>
+          <a:blip r:embed="rId3">
+            <a:alphaModFix/>
+          </a:blip>
+          <a:stretch>
+            <a:fillRect/>
+          </a:stretch>
+        </p:blipFill>
+        <p:spPr>
+          <a:xfrm>
+            <a:off x="4331950" y="1083820"/>
+            <a:ext cx="3830974" cy="2975850"/>
+          </a:xfrm>
+          <a:prstGeom prst="rect">
+            <a:avLst/>
+          </a:prstGeom>
+          <a:noFill/>
+          <a:ln>
+            <a:noFill/>
+          </a:ln>
+        </p:spPr>
+      </p:pic>
+    </p:spTree>
+  </p:cSld>
+  <p:clrMapOvr>
+    <a:masterClrMapping/>
+  </p:clrMapOvr>
+</p:sld>
+</file>
+
+<file path=ppt/slides/slide3.xml><?xml version="1.0" encoding="utf-8"?>
+<p:sld xmlns:a="http://schemas.openxmlformats.org/drawingml/2006/main" xmlns:r="http://schemas.openxmlformats.org/officeDocument/2006/relationships" xmlns:p="http://schemas.openxmlformats.org/presentationml/2006/main">
+  <p:cSld>
+    <p:spTree>
+      <p:nvGrpSpPr>
+        <p:cNvPr id="1" name="Shape 78"/>
+        <p:cNvGrpSpPr/>
+        <p:nvPr/>
+      </p:nvGrpSpPr>
+      <p:grpSpPr>
+        <a:xfrm>
+          <a:off x="0" y="0"/>
+          <a:ext cx="0" cy="0"/>
+          <a:chOff x="0" y="0"/>
+          <a:chExt cx="0" cy="0"/>
+        </a:xfrm>
+      </p:grpSpPr>
+      <p:sp>
+        <p:nvSpPr>
+          <p:cNvPr id="79" name="Shape 79"/>
+          <p:cNvSpPr txBox="1">
+            <a:spLocks noGrp="1"/>
+          </p:cNvSpPr>
+          <p:nvPr>
+            <p:ph type="title"/>
+          </p:nvPr>
+        </p:nvSpPr>
+        <p:spPr>
+          <a:xfrm>
+            <a:off x="98250" y="16350"/>
+            <a:ext cx="8826600" cy="602700"/>
+          </a:xfrm>
+          <a:prstGeom prst="rect">
+            <a:avLst/>
+          </a:prstGeom>
+        </p:spPr>
+        <p:txBody>
+          <a:bodyPr lIns="91425" tIns="91425" rIns="91425" bIns="91425" anchor="ctr" anchorCtr="0">
+            <a:noAutofit/>
+          </a:bodyPr>
+          <a:lstStyle/>
+          <a:p>
+            <a:pPr lvl="0">
+              <a:spcBef>
+                <a:spcPts val="0"/>
+              </a:spcBef>
+              <a:buNone/>
+            </a:pPr>
+            <a:r>
+              <a:rPr lang="sv"/>
+              <a:t>Modelica Bouncing Ball example</a:t>
+            </a:r>
+          </a:p>
+        </p:txBody>
+      </p:sp>
+      <p:pic>
+        <p:nvPicPr>
+          <p:cNvPr id="80" name="Shape 80" descr="BB1.png"/>
+          <p:cNvPicPr preferRelativeResize="0"/>
+          <p:nvPr/>
+        </p:nvPicPr>
+        <p:blipFill>
+          <a:blip r:embed="rId3">
+            <a:alphaModFix/>
+          </a:blip>
+          <a:stretch>
+            <a:fillRect/>
+          </a:stretch>
+        </p:blipFill>
+        <p:spPr>
+          <a:xfrm>
+            <a:off x="4713175" y="1538600"/>
+            <a:ext cx="4806524" cy="3604899"/>
+          </a:xfrm>
+          <a:prstGeom prst="rect">
+            <a:avLst/>
+          </a:prstGeom>
+          <a:noFill/>
+          <a:ln>
+            <a:noFill/>
+          </a:ln>
+        </p:spPr>
+      </p:pic>
+      <p:sp>
+        <p:nvSpPr>
+          <p:cNvPr id="81" name="Shape 81"/>
+          <p:cNvSpPr txBox="1">
+            <a:spLocks noGrp="1"/>
+          </p:cNvSpPr>
+          <p:nvPr>
+            <p:ph type="body" idx="4294967295"/>
+          </p:nvPr>
+        </p:nvSpPr>
+        <p:spPr>
+          <a:xfrm>
+            <a:off x="-1" y="785525"/>
+            <a:ext cx="5473051" cy="4187100"/>
+          </a:xfrm>
+          <a:prstGeom prst="rect">
+            <a:avLst/>
+          </a:prstGeom>
+        </p:spPr>
+        <p:txBody>
+          <a:bodyPr lIns="91425" tIns="91425" rIns="91425" bIns="91425" anchor="t" anchorCtr="0">
+            <a:noAutofit/>
+          </a:bodyPr>
+          <a:lstStyle/>
+          <a:p>
+            <a:pPr lvl="0" rtl="0">
+              <a:lnSpc>
+                <a:spcPct val="115000"/>
+              </a:lnSpc>
+              <a:spcBef>
+                <a:spcPts val="0"/>
+              </a:spcBef>
+              <a:spcAft>
+                <a:spcPts val="0"/>
+              </a:spcAft>
+              <a:buNone/>
+            </a:pPr>
+            <a:r>
+              <a:rPr lang="sv" sz="1200" b="1" dirty="0">
+                <a:solidFill>
+                  <a:srgbClr val="0000FF"/>
+                </a:solidFill>
+                <a:latin typeface="Courier New"/>
+                <a:ea typeface="Courier New"/>
+                <a:cs typeface="Courier New"/>
+                <a:sym typeface="Courier New"/>
+              </a:rPr>
+              <a:t>model</a:t>
+            </a:r>
+            <a:r>
+              <a:rPr lang="sv" sz="1200" dirty="0">
+                <a:solidFill>
+                  <a:srgbClr val="000000"/>
+                </a:solidFill>
+                <a:latin typeface="Courier New"/>
+                <a:ea typeface="Courier New"/>
+                <a:cs typeface="Courier New"/>
+                <a:sym typeface="Courier New"/>
+              </a:rPr>
+              <a:t> BouncingBall </a:t>
+            </a:r>
+            <a:r>
+              <a:rPr lang="sv" sz="1200" dirty="0">
+                <a:solidFill>
+                  <a:srgbClr val="38761D"/>
+                </a:solidFill>
+                <a:latin typeface="Courier New"/>
+                <a:ea typeface="Courier New"/>
+                <a:cs typeface="Courier New"/>
+                <a:sym typeface="Courier New"/>
+              </a:rPr>
+              <a:t>//The 'classic' bouncing ball model</a:t>
+            </a:r>
+          </a:p>
+          <a:p>
+            <a:pPr lvl="0">
+              <a:lnSpc>
+                <a:spcPct val="115000"/>
+              </a:lnSpc>
+              <a:spcBef>
+                <a:spcPts val="0"/>
+              </a:spcBef>
+              <a:spcAft>
+                <a:spcPts val="0"/>
+              </a:spcAft>
+              <a:buNone/>
+            </a:pPr>
+            <a:r>
+              <a:rPr lang="sv" sz="1200" dirty="0">
+                <a:solidFill>
+                  <a:srgbClr val="000000"/>
+                </a:solidFill>
+                <a:latin typeface="Courier New"/>
+                <a:ea typeface="Courier New"/>
+                <a:cs typeface="Courier New"/>
+                <a:sym typeface="Courier New"/>
+              </a:rPr>
+              <a:t>  </a:t>
+            </a:r>
+            <a:r>
+              <a:rPr lang="sv" sz="1200" b="1" dirty="0">
+                <a:solidFill>
+                  <a:srgbClr val="0000FF"/>
+                </a:solidFill>
+                <a:latin typeface="Courier New"/>
+                <a:ea typeface="Courier New"/>
+                <a:cs typeface="Courier New"/>
+                <a:sym typeface="Courier New"/>
+              </a:rPr>
+              <a:t>parameter</a:t>
+            </a:r>
+            <a:r>
+              <a:rPr lang="sv" sz="1200" dirty="0">
+                <a:solidFill>
+                  <a:srgbClr val="000000"/>
+                </a:solidFill>
+                <a:latin typeface="Courier New"/>
+                <a:ea typeface="Courier New"/>
+                <a:cs typeface="Courier New"/>
+                <a:sym typeface="Courier New"/>
+              </a:rPr>
+              <a:t> Real e = 0.8; </a:t>
+            </a:r>
+            <a:r>
+              <a:rPr lang="sv" sz="1200" dirty="0">
+                <a:solidFill>
+                  <a:srgbClr val="38761D"/>
+                </a:solidFill>
+                <a:latin typeface="Courier New"/>
+                <a:ea typeface="Courier New"/>
+                <a:cs typeface="Courier New"/>
+                <a:sym typeface="Courier New"/>
+              </a:rPr>
+              <a:t>//Elasticity coefficient</a:t>
+            </a:r>
+          </a:p>
+          <a:p>
+            <a:pPr lvl="0">
+              <a:lnSpc>
+                <a:spcPct val="115000"/>
+              </a:lnSpc>
+              <a:spcBef>
+                <a:spcPts val="0"/>
+              </a:spcBef>
+              <a:spcAft>
+                <a:spcPts val="0"/>
+              </a:spcAft>
+              <a:buNone/>
+            </a:pPr>
+            <a:r>
+              <a:rPr lang="sv" sz="1200" dirty="0">
+                <a:solidFill>
+                  <a:srgbClr val="000000"/>
+                </a:solidFill>
+                <a:latin typeface="Courier New"/>
+                <a:ea typeface="Courier New"/>
+                <a:cs typeface="Courier New"/>
+                <a:sym typeface="Courier New"/>
+              </a:rPr>
+              <a:t>  </a:t>
+            </a:r>
+            <a:r>
+              <a:rPr lang="sv" sz="1200" b="1" dirty="0">
+                <a:solidFill>
+                  <a:srgbClr val="0000FF"/>
+                </a:solidFill>
+                <a:latin typeface="Courier New"/>
+                <a:ea typeface="Courier New"/>
+                <a:cs typeface="Courier New"/>
+                <a:sym typeface="Courier New"/>
+              </a:rPr>
+              <a:t>parameter</a:t>
+            </a:r>
+            <a:r>
+              <a:rPr lang="sv" sz="1200" dirty="0">
+                <a:solidFill>
+                  <a:srgbClr val="000000"/>
+                </a:solidFill>
+                <a:latin typeface="Courier New"/>
+                <a:ea typeface="Courier New"/>
+                <a:cs typeface="Courier New"/>
+                <a:sym typeface="Courier New"/>
+              </a:rPr>
+              <a:t> Real g = 9.81; </a:t>
+            </a:r>
+            <a:r>
+              <a:rPr lang="sv" sz="1200" dirty="0">
+                <a:solidFill>
+                  <a:srgbClr val="38761D"/>
+                </a:solidFill>
+                <a:latin typeface="Courier New"/>
+                <a:ea typeface="Courier New"/>
+                <a:cs typeface="Courier New"/>
+                <a:sym typeface="Courier New"/>
+              </a:rPr>
+              <a:t>//Acceleration due to gravity</a:t>
+            </a:r>
+          </a:p>
+          <a:p>
+            <a:pPr lvl="0">
+              <a:lnSpc>
+                <a:spcPct val="115000"/>
+              </a:lnSpc>
+              <a:spcBef>
+                <a:spcPts val="0"/>
+              </a:spcBef>
+              <a:spcAft>
+                <a:spcPts val="0"/>
+              </a:spcAft>
+              <a:buNone/>
+            </a:pPr>
+            <a:r>
+              <a:rPr lang="sv" sz="1200" dirty="0">
+                <a:solidFill>
+                  <a:srgbClr val="000000"/>
+                </a:solidFill>
+                <a:latin typeface="Courier New"/>
+                <a:ea typeface="Courier New"/>
+                <a:cs typeface="Courier New"/>
+                <a:sym typeface="Courier New"/>
+              </a:rPr>
+              <a:t>  Height h(start=1); </a:t>
+            </a:r>
+            <a:r>
+              <a:rPr lang="sv" sz="1200" dirty="0">
+                <a:solidFill>
+                  <a:srgbClr val="38761D"/>
+                </a:solidFill>
+                <a:latin typeface="Courier New"/>
+                <a:ea typeface="Courier New"/>
+                <a:cs typeface="Courier New"/>
+                <a:sym typeface="Courier New"/>
+              </a:rPr>
+              <a:t>//Height of the ball</a:t>
+            </a:r>
+          </a:p>
+          <a:p>
+            <a:pPr lvl="0">
+              <a:lnSpc>
+                <a:spcPct val="115000"/>
+              </a:lnSpc>
+              <a:spcBef>
+                <a:spcPts val="0"/>
+              </a:spcBef>
+              <a:spcAft>
+                <a:spcPts val="0"/>
+              </a:spcAft>
+              <a:buNone/>
+            </a:pPr>
+            <a:r>
+              <a:rPr lang="sv" sz="1200" dirty="0">
+                <a:solidFill>
+                  <a:srgbClr val="000000"/>
+                </a:solidFill>
+                <a:latin typeface="Courier New"/>
+                <a:ea typeface="Courier New"/>
+                <a:cs typeface="Courier New"/>
+                <a:sym typeface="Courier New"/>
+              </a:rPr>
+              <a:t>  Velocity v(start=0); </a:t>
+            </a:r>
+            <a:r>
+              <a:rPr lang="sv" sz="1200" dirty="0">
+                <a:solidFill>
+                  <a:srgbClr val="38761D"/>
+                </a:solidFill>
+                <a:latin typeface="Courier New"/>
+                <a:ea typeface="Courier New"/>
+                <a:cs typeface="Courier New"/>
+                <a:sym typeface="Courier New"/>
+              </a:rPr>
+              <a:t>//Velocity of the ball</a:t>
+            </a:r>
+          </a:p>
+          <a:p>
+            <a:pPr lvl="0">
+              <a:lnSpc>
+                <a:spcPct val="115000"/>
+              </a:lnSpc>
+              <a:spcBef>
+                <a:spcPts val="0"/>
+              </a:spcBef>
+              <a:spcAft>
+                <a:spcPts val="0"/>
+              </a:spcAft>
+              <a:buNone/>
+            </a:pPr>
+            <a:r>
+              <a:rPr lang="sv" sz="1200" b="1" dirty="0">
+                <a:solidFill>
+                  <a:srgbClr val="0000FF"/>
+                </a:solidFill>
+                <a:latin typeface="Courier New"/>
+                <a:ea typeface="Courier New"/>
+                <a:cs typeface="Courier New"/>
+                <a:sym typeface="Courier New"/>
+              </a:rPr>
+              <a:t>equation</a:t>
+            </a:r>
+          </a:p>
+          <a:p>
+            <a:pPr lvl="0">
+              <a:lnSpc>
+                <a:spcPct val="115000"/>
+              </a:lnSpc>
+              <a:spcBef>
+                <a:spcPts val="0"/>
+              </a:spcBef>
+              <a:spcAft>
+                <a:spcPts val="0"/>
+              </a:spcAft>
+              <a:buNone/>
+            </a:pPr>
+            <a:r>
+              <a:rPr lang="sv" sz="1200" dirty="0">
+                <a:solidFill>
+                  <a:srgbClr val="000000"/>
+                </a:solidFill>
+                <a:latin typeface="Courier New"/>
+                <a:ea typeface="Courier New"/>
+                <a:cs typeface="Courier New"/>
+                <a:sym typeface="Courier New"/>
+              </a:rPr>
+              <a:t>  </a:t>
+            </a:r>
+            <a:r>
+              <a:rPr lang="sv" sz="1200" b="1" dirty="0">
+                <a:solidFill>
+                  <a:srgbClr val="0000FF"/>
+                </a:solidFill>
+                <a:latin typeface="Courier New"/>
+                <a:ea typeface="Courier New"/>
+                <a:cs typeface="Courier New"/>
+                <a:sym typeface="Courier New"/>
+              </a:rPr>
+              <a:t>der</a:t>
+            </a:r>
+            <a:r>
+              <a:rPr lang="sv" sz="1200" dirty="0">
+                <a:solidFill>
+                  <a:srgbClr val="000000"/>
+                </a:solidFill>
+                <a:latin typeface="Courier New"/>
+                <a:ea typeface="Courier New"/>
+                <a:cs typeface="Courier New"/>
+                <a:sym typeface="Courier New"/>
+              </a:rPr>
+              <a:t>(h) = v; </a:t>
+            </a:r>
+            <a:r>
+              <a:rPr lang="sv" sz="1200" dirty="0">
+                <a:solidFill>
+                  <a:srgbClr val="38761D"/>
+                </a:solidFill>
+                <a:latin typeface="Courier New"/>
+                <a:ea typeface="Courier New"/>
+                <a:cs typeface="Courier New"/>
+                <a:sym typeface="Courier New"/>
+              </a:rPr>
+              <a:t>//Newtons second law</a:t>
+            </a:r>
+          </a:p>
+          <a:p>
+            <a:pPr lvl="0">
+              <a:lnSpc>
+                <a:spcPct val="115000"/>
+              </a:lnSpc>
+              <a:spcBef>
+                <a:spcPts val="0"/>
+              </a:spcBef>
+              <a:spcAft>
+                <a:spcPts val="0"/>
+              </a:spcAft>
+              <a:buNone/>
+            </a:pPr>
+            <a:r>
+              <a:rPr lang="sv" sz="1200" dirty="0">
+                <a:solidFill>
+                  <a:srgbClr val="000000"/>
+                </a:solidFill>
+                <a:latin typeface="Courier New"/>
+                <a:ea typeface="Courier New"/>
+                <a:cs typeface="Courier New"/>
+                <a:sym typeface="Courier New"/>
+              </a:rPr>
+              <a:t>  </a:t>
+            </a:r>
+            <a:r>
+              <a:rPr lang="sv" sz="1200" b="1" dirty="0">
+                <a:solidFill>
+                  <a:srgbClr val="0000FF"/>
+                </a:solidFill>
+                <a:latin typeface="Courier New"/>
+                <a:ea typeface="Courier New"/>
+                <a:cs typeface="Courier New"/>
+                <a:sym typeface="Courier New"/>
+              </a:rPr>
+              <a:t>der</a:t>
+            </a:r>
+            <a:r>
+              <a:rPr lang="sv" sz="1200" dirty="0">
+                <a:solidFill>
+                  <a:srgbClr val="000000"/>
+                </a:solidFill>
+                <a:latin typeface="Courier New"/>
+                <a:ea typeface="Courier New"/>
+                <a:cs typeface="Courier New"/>
+                <a:sym typeface="Courier New"/>
+              </a:rPr>
+              <a:t>(v) = -g;</a:t>
+            </a:r>
+          </a:p>
+          <a:p>
+            <a:pPr lvl="0">
+              <a:lnSpc>
+                <a:spcPct val="115000"/>
+              </a:lnSpc>
+              <a:spcBef>
+                <a:spcPts val="0"/>
+              </a:spcBef>
+              <a:spcAft>
+                <a:spcPts val="0"/>
+              </a:spcAft>
+              <a:buNone/>
+            </a:pPr>
+            <a:r>
+              <a:rPr lang="sv" sz="1200" dirty="0">
+                <a:solidFill>
+                  <a:srgbClr val="000000"/>
+                </a:solidFill>
+                <a:latin typeface="Courier New"/>
+                <a:ea typeface="Courier New"/>
+                <a:cs typeface="Courier New"/>
+                <a:sym typeface="Courier New"/>
+              </a:rPr>
+              <a:t>  </a:t>
+            </a:r>
+            <a:r>
+              <a:rPr lang="sv" sz="1200" b="1" dirty="0">
+                <a:solidFill>
+                  <a:srgbClr val="0000FF"/>
+                </a:solidFill>
+                <a:latin typeface="Courier New"/>
+                <a:ea typeface="Courier New"/>
+                <a:cs typeface="Courier New"/>
+                <a:sym typeface="Courier New"/>
+              </a:rPr>
+              <a:t>when</a:t>
+            </a:r>
+            <a:r>
+              <a:rPr lang="sv" sz="1200" dirty="0">
+                <a:solidFill>
+                  <a:srgbClr val="000000"/>
+                </a:solidFill>
+                <a:latin typeface="Courier New"/>
+                <a:ea typeface="Courier New"/>
+                <a:cs typeface="Courier New"/>
+                <a:sym typeface="Courier New"/>
+              </a:rPr>
+              <a:t> h &lt;= 0 </a:t>
+            </a:r>
+            <a:r>
+              <a:rPr lang="sv" sz="1200" b="1" dirty="0">
+                <a:solidFill>
+                  <a:srgbClr val="0000FF"/>
+                </a:solidFill>
+                <a:latin typeface="Courier New"/>
+                <a:ea typeface="Courier New"/>
+                <a:cs typeface="Courier New"/>
+                <a:sym typeface="Courier New"/>
+              </a:rPr>
+              <a:t>then</a:t>
+            </a:r>
+          </a:p>
+          <a:p>
+            <a:pPr lvl="0">
+              <a:lnSpc>
+                <a:spcPct val="115000"/>
+              </a:lnSpc>
+              <a:spcBef>
+                <a:spcPts val="0"/>
+              </a:spcBef>
+              <a:spcAft>
+                <a:spcPts val="0"/>
+              </a:spcAft>
+              <a:buNone/>
+            </a:pPr>
+            <a:r>
+              <a:rPr lang="sv" sz="1200" dirty="0">
+                <a:solidFill>
+                  <a:srgbClr val="000000"/>
+                </a:solidFill>
+                <a:latin typeface="Courier New"/>
+                <a:ea typeface="Courier New"/>
+                <a:cs typeface="Courier New"/>
+                <a:sym typeface="Courier New"/>
+              </a:rPr>
+              <a:t>    reinit(v, -e*pre(v)); </a:t>
+            </a:r>
+            <a:r>
+              <a:rPr lang="sv" sz="1200" dirty="0">
+                <a:solidFill>
+                  <a:srgbClr val="38761D"/>
+                </a:solidFill>
+                <a:latin typeface="Courier New"/>
+                <a:ea typeface="Courier New"/>
+                <a:cs typeface="Courier New"/>
+                <a:sym typeface="Courier New"/>
+              </a:rPr>
+              <a:t>//Set velocity after bounce</a:t>
+            </a:r>
+          </a:p>
+          <a:p>
+            <a:pPr lvl="0">
+              <a:lnSpc>
+                <a:spcPct val="115000"/>
+              </a:lnSpc>
+              <a:spcBef>
+                <a:spcPts val="0"/>
+              </a:spcBef>
+              <a:spcAft>
+                <a:spcPts val="0"/>
+              </a:spcAft>
+              <a:buNone/>
+            </a:pPr>
+            <a:r>
+              <a:rPr lang="sv" sz="1200" dirty="0">
+                <a:solidFill>
+                  <a:srgbClr val="000000"/>
+                </a:solidFill>
+                <a:latin typeface="Courier New"/>
+                <a:ea typeface="Courier New"/>
+                <a:cs typeface="Courier New"/>
+                <a:sym typeface="Courier New"/>
+              </a:rPr>
+              <a:t>  </a:t>
+            </a:r>
+            <a:r>
+              <a:rPr lang="sv" sz="1200" b="1" dirty="0">
+                <a:solidFill>
+                  <a:srgbClr val="0000FF"/>
+                </a:solidFill>
+                <a:latin typeface="Courier New"/>
+                <a:ea typeface="Courier New"/>
+                <a:cs typeface="Courier New"/>
+                <a:sym typeface="Courier New"/>
+              </a:rPr>
+              <a:t>end when</a:t>
+            </a:r>
+            <a:r>
+              <a:rPr lang="sv" sz="1200" dirty="0">
+                <a:solidFill>
+                  <a:srgbClr val="000000"/>
+                </a:solidFill>
+                <a:latin typeface="Courier New"/>
+                <a:ea typeface="Courier New"/>
+                <a:cs typeface="Courier New"/>
+                <a:sym typeface="Courier New"/>
+              </a:rPr>
+              <a:t>;</a:t>
+            </a:r>
+          </a:p>
+          <a:p>
+            <a:pPr lvl="0">
+              <a:lnSpc>
+                <a:spcPct val="115000"/>
+              </a:lnSpc>
+              <a:spcBef>
+                <a:spcPts val="0"/>
+              </a:spcBef>
+              <a:spcAft>
+                <a:spcPts val="0"/>
+              </a:spcAft>
+              <a:buNone/>
+            </a:pPr>
+            <a:r>
+              <a:rPr lang="sv" sz="1200" b="1" dirty="0">
+                <a:solidFill>
+                  <a:srgbClr val="0000FF"/>
+                </a:solidFill>
+                <a:latin typeface="Courier New"/>
+                <a:ea typeface="Courier New"/>
+                <a:cs typeface="Courier New"/>
+                <a:sym typeface="Courier New"/>
+              </a:rPr>
+              <a:t>end</a:t>
+            </a:r>
+            <a:r>
+              <a:rPr lang="sv" sz="1200" dirty="0">
+                <a:solidFill>
+                  <a:srgbClr val="000000"/>
+                </a:solidFill>
+                <a:latin typeface="Courier New"/>
+                <a:ea typeface="Courier New"/>
+                <a:cs typeface="Courier New"/>
+                <a:sym typeface="Courier New"/>
+              </a:rPr>
+              <a:t> BouncingBall;</a:t>
+            </a:r>
+          </a:p>
+          <a:p>
+            <a:pPr lvl="0">
+              <a:spcBef>
+                <a:spcPts val="0"/>
+              </a:spcBef>
+              <a:buNone/>
+            </a:pPr>
+            <a:endParaRPr dirty="0"/>
+          </a:p>
+        </p:txBody>
+      </p:sp>
+    </p:spTree>
+  </p:cSld>
+  <p:clrMapOvr>
+    <a:masterClrMapping/>
+  </p:clrMapOvr>
+</p:sld>
+</file>
+
+<file path=ppt/slides/slide4.xml><?xml version="1.0" encoding="utf-8"?>
+<p:sld xmlns:a="http://schemas.openxmlformats.org/drawingml/2006/main" xmlns:r="http://schemas.openxmlformats.org/officeDocument/2006/relationships" xmlns:p="http://schemas.openxmlformats.org/presentationml/2006/main">
+  <p:cSld>
+    <p:spTree>
+      <p:nvGrpSpPr>
+        <p:cNvPr id="1" name=""/>
+        <p:cNvGrpSpPr/>
+        <p:nvPr/>
+      </p:nvGrpSpPr>
+      <p:grpSpPr>
+        <a:xfrm>
+          <a:off x="0" y="0"/>
+          <a:ext cx="0" cy="0"/>
+          <a:chOff x="0" y="0"/>
+          <a:chExt cx="0" cy="0"/>
+        </a:xfrm>
+      </p:grpSpPr>
+      <p:sp>
+        <p:nvSpPr>
+          <p:cNvPr id="2" name="Title 1">
+            <a:extLst>
+              <a:ext uri="{FF2B5EF4-FFF2-40B4-BE49-F238E27FC236}">
+                <a16:creationId xmlns:a16="http://schemas.microsoft.com/office/drawing/2014/main" id="{CB027881-E06F-4CEA-A56A-590AF7F813A2}"/>
+              </a:ext>
+            </a:extLst>
+          </p:cNvPr>
+          <p:cNvSpPr>
+            <a:spLocks noGrp="1"/>
+          </p:cNvSpPr>
+          <p:nvPr>
+            <p:ph type="title"/>
+          </p:nvPr>
+        </p:nvSpPr>
+        <p:spPr/>
+        <p:txBody>
+          <a:bodyPr/>
+          <a:lstStyle/>
+          <a:p>
+            <a:r>
+              <a:rPr lang="sv-SE" dirty="0"/>
+              <a:t>Source tree name lookup limitations</a:t>
+            </a:r>
+            <a:endParaRPr lang="en-US" dirty="0"/>
+          </a:p>
+        </p:txBody>
+      </p:sp>
+      <p:sp>
+        <p:nvSpPr>
+          <p:cNvPr id="3" name="TextBox 2">
+            <a:extLst>
+              <a:ext uri="{FF2B5EF4-FFF2-40B4-BE49-F238E27FC236}">
+                <a16:creationId xmlns:a16="http://schemas.microsoft.com/office/drawing/2014/main" id="{3BA7DC01-C747-4EBD-9E3E-ED4D18D02FBA}"/>
+              </a:ext>
+            </a:extLst>
+          </p:cNvPr>
+          <p:cNvSpPr txBox="1"/>
+          <p:nvPr/>
+        </p:nvSpPr>
+        <p:spPr>
+          <a:xfrm>
+            <a:off x="98250" y="720842"/>
+            <a:ext cx="8391654" cy="2123658"/>
+          </a:xfrm>
+          <a:prstGeom prst="rect">
+            <a:avLst/>
+          </a:prstGeom>
+          <a:noFill/>
+        </p:spPr>
+        <p:txBody>
+          <a:bodyPr wrap="square" rtlCol="0">
+            <a:spAutoFit/>
+          </a:bodyPr>
+          <a:lstStyle/>
+          <a:p>
+            <a:r>
+              <a:rPr lang="en-US" sz="1200" b="1" dirty="0">
+                <a:solidFill>
+                  <a:srgbClr val="0000FF"/>
+                </a:solidFill>
+                <a:latin typeface="Courier New" panose="02070309020205020404" pitchFamily="49" charset="0"/>
+                <a:cs typeface="Courier New" panose="02070309020205020404" pitchFamily="49" charset="0"/>
+              </a:rPr>
+              <a:t>package</a:t>
+            </a:r>
+            <a:r>
+              <a:rPr lang="en-US" sz="1200" dirty="0">
+                <a:latin typeface="Courier New" panose="02070309020205020404" pitchFamily="49" charset="0"/>
+                <a:cs typeface="Courier New" panose="02070309020205020404" pitchFamily="49" charset="0"/>
+              </a:rPr>
+              <a:t> P</a:t>
+            </a:r>
+          </a:p>
+          <a:p>
+            <a:r>
+              <a:rPr lang="en-US" sz="1200" dirty="0">
+                <a:latin typeface="Courier New" panose="02070309020205020404" pitchFamily="49" charset="0"/>
+                <a:cs typeface="Courier New" panose="02070309020205020404" pitchFamily="49" charset="0"/>
+              </a:rPr>
+              <a:t>  </a:t>
+            </a:r>
+            <a:r>
+              <a:rPr lang="en-US" sz="1200" b="1" dirty="0">
+                <a:solidFill>
+                  <a:srgbClr val="0000FF"/>
+                </a:solidFill>
+                <a:latin typeface="Courier New" panose="02070309020205020404" pitchFamily="49" charset="0"/>
+                <a:cs typeface="Courier New" panose="02070309020205020404" pitchFamily="49" charset="0"/>
+              </a:rPr>
+              <a:t>model</a:t>
+            </a:r>
+            <a:r>
+              <a:rPr lang="en-US" sz="1200" dirty="0">
+                <a:latin typeface="Courier New" panose="02070309020205020404" pitchFamily="49" charset="0"/>
+                <a:cs typeface="Courier New" panose="02070309020205020404" pitchFamily="49" charset="0"/>
+              </a:rPr>
+              <a:t> M1</a:t>
+            </a:r>
+          </a:p>
+          <a:p>
+            <a:r>
+              <a:rPr lang="en-US" sz="1200" dirty="0">
+                <a:latin typeface="Courier New" panose="02070309020205020404" pitchFamily="49" charset="0"/>
+                <a:cs typeface="Courier New" panose="02070309020205020404" pitchFamily="49" charset="0"/>
+              </a:rPr>
+              <a:t>    </a:t>
+            </a:r>
+            <a:r>
+              <a:rPr lang="en-US" sz="1200" b="1" dirty="0">
+                <a:solidFill>
+                  <a:srgbClr val="0000FF"/>
+                </a:solidFill>
+                <a:latin typeface="Courier New" panose="02070309020205020404" pitchFamily="49" charset="0"/>
+                <a:cs typeface="Courier New" panose="02070309020205020404" pitchFamily="49" charset="0"/>
+              </a:rPr>
+              <a:t>replaceable package </a:t>
+            </a:r>
+            <a:r>
+              <a:rPr lang="en-US" sz="1200" dirty="0">
+                <a:latin typeface="Courier New" panose="02070309020205020404" pitchFamily="49" charset="0"/>
+                <a:cs typeface="Courier New" panose="02070309020205020404" pitchFamily="49" charset="0"/>
+              </a:rPr>
+              <a:t>P0 = P1;</a:t>
+            </a:r>
+          </a:p>
+          <a:p>
+            <a:r>
+              <a:rPr lang="en-US" sz="1200" dirty="0">
+                <a:latin typeface="Courier New" panose="02070309020205020404" pitchFamily="49" charset="0"/>
+                <a:cs typeface="Courier New" panose="02070309020205020404" pitchFamily="49" charset="0"/>
+              </a:rPr>
+              <a:t>    </a:t>
+            </a:r>
+            <a:r>
+              <a:rPr lang="en-US" sz="1200" b="1" dirty="0">
+                <a:solidFill>
+                  <a:srgbClr val="0000FF"/>
+                </a:solidFill>
+                <a:latin typeface="Courier New" panose="02070309020205020404" pitchFamily="49" charset="0"/>
+                <a:cs typeface="Courier New" panose="02070309020205020404" pitchFamily="49" charset="0"/>
+              </a:rPr>
+              <a:t>function</a:t>
+            </a:r>
+            <a:r>
+              <a:rPr lang="en-US" sz="1200" dirty="0">
+                <a:latin typeface="Courier New" panose="02070309020205020404" pitchFamily="49" charset="0"/>
+                <a:cs typeface="Courier New" panose="02070309020205020404" pitchFamily="49" charset="0"/>
+              </a:rPr>
+              <a:t> f = P0.f;</a:t>
+            </a:r>
+          </a:p>
+          <a:p>
+            <a:r>
+              <a:rPr lang="en-US" sz="1200" dirty="0">
+                <a:latin typeface="Courier New" panose="02070309020205020404" pitchFamily="49" charset="0"/>
+                <a:cs typeface="Courier New" panose="02070309020205020404" pitchFamily="49" charset="0"/>
+              </a:rPr>
+              <a:t>  </a:t>
+            </a:r>
+            <a:r>
+              <a:rPr lang="en-US" sz="1200" b="1" dirty="0">
+                <a:solidFill>
+                  <a:srgbClr val="0000FF"/>
+                </a:solidFill>
+                <a:latin typeface="Courier New" panose="02070309020205020404" pitchFamily="49" charset="0"/>
+                <a:cs typeface="Courier New" panose="02070309020205020404" pitchFamily="49" charset="0"/>
+              </a:rPr>
+              <a:t>end</a:t>
+            </a:r>
+            <a:r>
+              <a:rPr lang="en-US" sz="1200" dirty="0">
+                <a:latin typeface="Courier New" panose="02070309020205020404" pitchFamily="49" charset="0"/>
+                <a:cs typeface="Courier New" panose="02070309020205020404" pitchFamily="49" charset="0"/>
+              </a:rPr>
+              <a:t> M1;</a:t>
+            </a:r>
+          </a:p>
+          <a:p>
+            <a:endParaRPr lang="en-US" sz="1200" dirty="0">
+              <a:latin typeface="Courier New" panose="02070309020205020404" pitchFamily="49" charset="0"/>
+              <a:cs typeface="Courier New" panose="02070309020205020404" pitchFamily="49" charset="0"/>
+            </a:endParaRPr>
+          </a:p>
+          <a:p>
+            <a:r>
+              <a:rPr lang="en-US" sz="1200" dirty="0">
+                <a:latin typeface="Courier New" panose="02070309020205020404" pitchFamily="49" charset="0"/>
+                <a:cs typeface="Courier New" panose="02070309020205020404" pitchFamily="49" charset="0"/>
+              </a:rPr>
+              <a:t>  </a:t>
+            </a:r>
+            <a:r>
+              <a:rPr lang="en-US" sz="1200" b="1" dirty="0">
+                <a:solidFill>
+                  <a:srgbClr val="0000FF"/>
+                </a:solidFill>
+                <a:latin typeface="Courier New" panose="02070309020205020404" pitchFamily="49" charset="0"/>
+                <a:cs typeface="Courier New" panose="02070309020205020404" pitchFamily="49" charset="0"/>
+              </a:rPr>
+              <a:t>model</a:t>
+            </a:r>
+            <a:r>
+              <a:rPr lang="en-US" sz="1200" dirty="0">
+                <a:latin typeface="Courier New" panose="02070309020205020404" pitchFamily="49" charset="0"/>
+                <a:cs typeface="Courier New" panose="02070309020205020404" pitchFamily="49" charset="0"/>
+              </a:rPr>
+              <a:t> M2</a:t>
+            </a:r>
+          </a:p>
+          <a:p>
+            <a:r>
+              <a:rPr lang="en-US" sz="1200" dirty="0">
+                <a:latin typeface="Courier New" panose="02070309020205020404" pitchFamily="49" charset="0"/>
+                <a:cs typeface="Courier New" panose="02070309020205020404" pitchFamily="49" charset="0"/>
+              </a:rPr>
+              <a:t>    M1 m(</a:t>
+            </a:r>
+            <a:r>
+              <a:rPr lang="en-US" sz="1200" b="1" dirty="0">
+                <a:solidFill>
+                  <a:srgbClr val="0000FF"/>
+                </a:solidFill>
+                <a:latin typeface="Courier New" panose="02070309020205020404" pitchFamily="49" charset="0"/>
+                <a:cs typeface="Courier New" panose="02070309020205020404" pitchFamily="49" charset="0"/>
+              </a:rPr>
+              <a:t>replaceable package </a:t>
+            </a:r>
+            <a:r>
+              <a:rPr lang="en-US" sz="1200" dirty="0">
+                <a:latin typeface="Courier New" panose="02070309020205020404" pitchFamily="49" charset="0"/>
+                <a:cs typeface="Courier New" panose="02070309020205020404" pitchFamily="49" charset="0"/>
+              </a:rPr>
+              <a:t>P0 = P2);</a:t>
+            </a:r>
+          </a:p>
+          <a:p>
+            <a:r>
+              <a:rPr lang="en-US" sz="1200" dirty="0">
+                <a:latin typeface="Courier New" panose="02070309020205020404" pitchFamily="49" charset="0"/>
+                <a:cs typeface="Courier New" panose="02070309020205020404" pitchFamily="49" charset="0"/>
+              </a:rPr>
+              <a:t>    Real y = </a:t>
+            </a:r>
+            <a:r>
+              <a:rPr lang="en-US" sz="1200" dirty="0" err="1">
+                <a:latin typeface="Courier New" panose="02070309020205020404" pitchFamily="49" charset="0"/>
+                <a:cs typeface="Courier New" panose="02070309020205020404" pitchFamily="49" charset="0"/>
+              </a:rPr>
+              <a:t>m.f</a:t>
+            </a:r>
+            <a:r>
+              <a:rPr lang="en-US" sz="1200" dirty="0">
+                <a:latin typeface="Courier New" panose="02070309020205020404" pitchFamily="49" charset="0"/>
+                <a:cs typeface="Courier New" panose="02070309020205020404" pitchFamily="49" charset="0"/>
+              </a:rPr>
+              <a:t> (10);</a:t>
+            </a:r>
+          </a:p>
+          <a:p>
+            <a:r>
+              <a:rPr lang="en-US" sz="1200" dirty="0">
+                <a:latin typeface="Courier New" panose="02070309020205020404" pitchFamily="49" charset="0"/>
+                <a:cs typeface="Courier New" panose="02070309020205020404" pitchFamily="49" charset="0"/>
+              </a:rPr>
+              <a:t>  </a:t>
+            </a:r>
+            <a:r>
+              <a:rPr lang="en-US" sz="1200" b="1" dirty="0">
+                <a:solidFill>
+                  <a:srgbClr val="0000FF"/>
+                </a:solidFill>
+                <a:latin typeface="Courier New" panose="02070309020205020404" pitchFamily="49" charset="0"/>
+                <a:cs typeface="Courier New" panose="02070309020205020404" pitchFamily="49" charset="0"/>
+              </a:rPr>
+              <a:t>end</a:t>
+            </a:r>
+            <a:r>
+              <a:rPr lang="en-US" sz="1200" dirty="0">
+                <a:latin typeface="Courier New" panose="02070309020205020404" pitchFamily="49" charset="0"/>
+                <a:cs typeface="Courier New" panose="02070309020205020404" pitchFamily="49" charset="0"/>
+              </a:rPr>
+              <a:t> M2;</a:t>
+            </a:r>
+          </a:p>
+          <a:p>
+            <a:r>
+              <a:rPr lang="en-US" sz="1200" b="1" dirty="0">
+                <a:solidFill>
+                  <a:srgbClr val="0000FF"/>
+                </a:solidFill>
+                <a:latin typeface="Courier New" panose="02070309020205020404" pitchFamily="49" charset="0"/>
+                <a:cs typeface="Courier New" panose="02070309020205020404" pitchFamily="49" charset="0"/>
+              </a:rPr>
+              <a:t>end</a:t>
+            </a:r>
+            <a:r>
+              <a:rPr lang="en-US" sz="1200" dirty="0">
+                <a:latin typeface="Courier New" panose="02070309020205020404" pitchFamily="49" charset="0"/>
+                <a:cs typeface="Courier New" panose="02070309020205020404" pitchFamily="49" charset="0"/>
+              </a:rPr>
+              <a:t> P;</a:t>
+            </a:r>
+          </a:p>
+        </p:txBody>
+      </p:sp>
+    </p:spTree>
+    <p:extLst>
+      <p:ext uri="{BB962C8B-B14F-4D97-AF65-F5344CB8AC3E}">
+        <p14:creationId xmlns:p14="http://schemas.microsoft.com/office/powerpoint/2010/main" val="1266933150"/>
+      </p:ext>
+    </p:extLst>
+  </p:cSld>
+  <p:clrMapOvr>
+    <a:masterClrMapping/>
+  </p:clrMapOvr>
+</p:sld>
+</file>
+
+<file path=ppt/slides/slide5.xml><?xml version="1.0" encoding="utf-8"?>
+<p:sld xmlns:a="http://schemas.openxmlformats.org/drawingml/2006/main" xmlns:r="http://schemas.openxmlformats.org/officeDocument/2006/relationships" xmlns:p="http://schemas.openxmlformats.org/presentationml/2006/main">
+  <p:cSld>
+    <p:spTree>
+      <p:nvGrpSpPr>
+        <p:cNvPr id="1" name="Shape 85"/>
+        <p:cNvGrpSpPr/>
+        <p:nvPr/>
+      </p:nvGrpSpPr>
+      <p:grpSpPr>
+        <a:xfrm>
+          <a:off x="0" y="0"/>
+          <a:ext cx="0" cy="0"/>
+          <a:chOff x="0" y="0"/>
+          <a:chExt cx="0" cy="0"/>
+        </a:xfrm>
+      </p:grpSpPr>
+      <p:sp>
+        <p:nvSpPr>
+          <p:cNvPr id="86" name="Shape 86"/>
+          <p:cNvSpPr txBox="1">
+            <a:spLocks noGrp="1"/>
+          </p:cNvSpPr>
+          <p:nvPr>
+            <p:ph type="title"/>
+          </p:nvPr>
+        </p:nvSpPr>
+        <p:spPr>
+          <a:xfrm>
+            <a:off x="471900" y="738725"/>
+            <a:ext cx="8222100" cy="767700"/>
+          </a:xfrm>
+          <a:prstGeom prst="rect">
+            <a:avLst/>
+          </a:prstGeom>
+        </p:spPr>
+        <p:txBody>
+          <a:bodyPr lIns="91425" tIns="91425" rIns="91425" bIns="91425" anchor="b" anchorCtr="0">
+            <a:noAutofit/>
+          </a:bodyPr>
+          <a:lstStyle/>
+          <a:p>
+            <a:pPr lvl="0">
+              <a:spcBef>
+                <a:spcPts val="0"/>
+              </a:spcBef>
+              <a:buNone/>
+            </a:pPr>
+            <a:r>
+              <a:rPr lang="sv" dirty="0"/>
+              <a:t>O</a:t>
+            </a:r>
+            <a:r>
+              <a:rPr lang="en-US" dirty="0"/>
+              <a:t>PTIMICA Compiler Toolkit and</a:t>
+            </a:r>
+            <a:r>
+              <a:rPr lang="sv" dirty="0"/>
+              <a:t> JModelica.org</a:t>
+            </a:r>
+          </a:p>
+        </p:txBody>
+      </p:sp>
+      <p:sp>
+        <p:nvSpPr>
+          <p:cNvPr id="87" name="Shape 87"/>
+          <p:cNvSpPr txBox="1">
+            <a:spLocks noGrp="1"/>
+          </p:cNvSpPr>
+          <p:nvPr>
+            <p:ph type="body" idx="1"/>
+          </p:nvPr>
+        </p:nvSpPr>
+        <p:spPr>
+          <a:xfrm>
+            <a:off x="471900" y="1919075"/>
+            <a:ext cx="8222100" cy="2710200"/>
+          </a:xfrm>
+          <a:prstGeom prst="rect">
+            <a:avLst/>
+          </a:prstGeom>
+        </p:spPr>
+        <p:txBody>
+          <a:bodyPr lIns="91425" tIns="91425" rIns="91425" bIns="91425" anchor="t" anchorCtr="0">
+            <a:noAutofit/>
+          </a:bodyPr>
+          <a:lstStyle/>
+          <a:p>
+            <a:pPr lvl="0">
+              <a:spcBef>
+                <a:spcPts val="0"/>
+              </a:spcBef>
+              <a:buNone/>
+            </a:pPr>
+            <a:endParaRPr dirty="0"/>
+          </a:p>
+        </p:txBody>
+      </p:sp>
+    </p:spTree>
+  </p:cSld>
+  <p:clrMapOvr>
+    <a:masterClrMapping/>
+  </p:clrMapOvr>
+</p:sld>
+</file>
+
+<file path=ppt/slides/slide6.xml><?xml version="1.0" encoding="utf-8"?>
+<p:sld xmlns:a="http://schemas.openxmlformats.org/drawingml/2006/main" xmlns:r="http://schemas.openxmlformats.org/officeDocument/2006/relationships" xmlns:p="http://schemas.openxmlformats.org/presentationml/2006/main">
+  <p:cSld>
+    <p:spTree>
+      <p:nvGrpSpPr>
+        <p:cNvPr id="1" name="Shape 91"/>
+        <p:cNvGrpSpPr/>
+        <p:nvPr/>
+      </p:nvGrpSpPr>
+      <p:grpSpPr>
+        <a:xfrm>
+          <a:off x="0" y="0"/>
+          <a:ext cx="0" cy="0"/>
+          <a:chOff x="0" y="0"/>
+          <a:chExt cx="0" cy="0"/>
+        </a:xfrm>
+      </p:grpSpPr>
+      <p:sp>
+        <p:nvSpPr>
+          <p:cNvPr id="92" name="Shape 92"/>
+          <p:cNvSpPr txBox="1">
+            <a:spLocks noGrp="1"/>
+          </p:cNvSpPr>
+          <p:nvPr>
+            <p:ph type="title"/>
+          </p:nvPr>
+        </p:nvSpPr>
+        <p:spPr>
+          <a:xfrm>
+            <a:off x="471900" y="738725"/>
+            <a:ext cx="8222100" cy="767700"/>
+          </a:xfrm>
+          <a:prstGeom prst="rect">
+            <a:avLst/>
+          </a:prstGeom>
+        </p:spPr>
+        <p:txBody>
+          <a:bodyPr lIns="91425" tIns="91425" rIns="91425" bIns="91425" anchor="b" anchorCtr="0">
+            <a:noAutofit/>
+          </a:bodyPr>
+          <a:lstStyle/>
+          <a:p>
+            <a:pPr lvl="0">
+              <a:spcBef>
+                <a:spcPts val="0"/>
+              </a:spcBef>
+              <a:buNone/>
+            </a:pPr>
+            <a:r>
+              <a:rPr lang="en-US" dirty="0"/>
+              <a:t>Model Testing Toolkit</a:t>
+            </a:r>
+            <a:endParaRPr lang="sv" dirty="0"/>
+          </a:p>
+        </p:txBody>
+      </p:sp>
+      <p:sp>
+        <p:nvSpPr>
+          <p:cNvPr id="93" name="Shape 93"/>
+          <p:cNvSpPr txBox="1">
+            <a:spLocks noGrp="1"/>
+          </p:cNvSpPr>
+          <p:nvPr>
+            <p:ph type="body" idx="1"/>
+          </p:nvPr>
+        </p:nvSpPr>
+        <p:spPr>
+          <a:xfrm>
+            <a:off x="471900" y="1919075"/>
+            <a:ext cx="8222100" cy="2710200"/>
+          </a:xfrm>
+          <a:prstGeom prst="rect">
+            <a:avLst/>
+          </a:prstGeom>
+        </p:spPr>
+        <p:txBody>
+          <a:bodyPr lIns="91425" tIns="91425" rIns="91425" bIns="91425" anchor="t" anchorCtr="0">
+            <a:noAutofit/>
+          </a:bodyPr>
+          <a:lstStyle/>
+          <a:p>
+            <a:pPr lvl="0">
+              <a:spcBef>
+                <a:spcPts val="0"/>
+              </a:spcBef>
+              <a:buNone/>
+            </a:pPr>
+            <a:endParaRPr dirty="0"/>
+          </a:p>
+        </p:txBody>
+      </p:sp>
+      <p:graphicFrame>
+        <p:nvGraphicFramePr>
+          <p:cNvPr id="2" name="Diagram 1">
+            <a:extLst>
+              <a:ext uri="{FF2B5EF4-FFF2-40B4-BE49-F238E27FC236}">
+                <a16:creationId xmlns:a16="http://schemas.microsoft.com/office/drawing/2014/main" id="{4A771E42-F786-4BB0-97DF-833B5A14CE91}"/>
+              </a:ext>
+            </a:extLst>
+          </p:cNvPr>
+          <p:cNvGraphicFramePr/>
+          <p:nvPr>
+            <p:extLst>
+              <p:ext uri="{D42A27DB-BD31-4B8C-83A1-F6EECF244321}">
+                <p14:modId xmlns:p14="http://schemas.microsoft.com/office/powerpoint/2010/main" val="2312780197"/>
+              </p:ext>
+            </p:extLst>
+          </p:nvPr>
+        </p:nvGraphicFramePr>
+        <p:xfrm>
+          <a:off x="1524000" y="539750"/>
+          <a:ext cx="6096000" cy="4064000"/>
+        </p:xfrm>
+        <a:graphic>
+          <a:graphicData uri="http://schemas.openxmlformats.org/drawingml/2006/diagram">
+            <dgm:relIds xmlns:dgm="http://schemas.openxmlformats.org/drawingml/2006/diagram" xmlns:r="http://schemas.openxmlformats.org/officeDocument/2006/relationships" r:dm="rId3" r:lo="rId4" r:qs="rId5" r:cs="rId6"/>
+          </a:graphicData>
+        </a:graphic>
+      </p:graphicFrame>
+    </p:spTree>
+  </p:cSld>
+  <p:clrMapOvr>
+    <a:masterClrMapping/>
+  </p:clrMapOvr>
+</p:sld>
+</file>
+
+<file path=ppt/slides/slide7.xml><?xml version="1.0" encoding="utf-8"?>
+<p:sld xmlns:a="http://schemas.openxmlformats.org/drawingml/2006/main" xmlns:r="http://schemas.openxmlformats.org/officeDocument/2006/relationships" xmlns:p="http://schemas.openxmlformats.org/presentationml/2006/main">
+  <p:cSld>
+    <p:spTree>
+      <p:nvGrpSpPr>
+        <p:cNvPr id="1" name="Shape 97"/>
+        <p:cNvGrpSpPr/>
+        <p:nvPr/>
+      </p:nvGrpSpPr>
+      <p:grpSpPr>
+        <a:xfrm>
+          <a:off x="0" y="0"/>
+          <a:ext cx="0" cy="0"/>
+          <a:chOff x="0" y="0"/>
+          <a:chExt cx="0" cy="0"/>
+        </a:xfrm>
+      </p:grpSpPr>
+      <p:sp>
+        <p:nvSpPr>
+          <p:cNvPr id="98" name="Shape 98"/>
+          <p:cNvSpPr txBox="1">
+            <a:spLocks noGrp="1"/>
+          </p:cNvSpPr>
+          <p:nvPr>
+            <p:ph type="title"/>
+          </p:nvPr>
+        </p:nvSpPr>
+        <p:spPr>
+          <a:prstGeom prst="rect">
+            <a:avLst/>
+          </a:prstGeom>
+        </p:spPr>
+        <p:txBody>
+          <a:bodyPr lIns="91425" tIns="91425" rIns="91425" bIns="91425" anchor="b" anchorCtr="0">
+            <a:noAutofit/>
+          </a:bodyPr>
+          <a:lstStyle/>
+          <a:p>
+            <a:pPr lvl="0">
+              <a:spcBef>
+                <a:spcPts val="0"/>
+              </a:spcBef>
+              <a:buNone/>
+            </a:pPr>
+            <a:r>
+              <a:rPr lang="en-US" dirty="0"/>
+              <a:t>Dependency rules</a:t>
+            </a:r>
+            <a:endParaRPr lang="sv" dirty="0"/>
+          </a:p>
+        </p:txBody>
+      </p:sp>
+      <p:sp>
+        <p:nvSpPr>
+          <p:cNvPr id="99" name="Shape 99"/>
+          <p:cNvSpPr txBox="1">
+            <a:spLocks noGrp="1"/>
+          </p:cNvSpPr>
+          <p:nvPr>
+            <p:ph type="body" idx="4294967295"/>
+          </p:nvPr>
+        </p:nvSpPr>
+        <p:spPr>
+          <a:xfrm>
+            <a:off x="166861" y="619050"/>
+            <a:ext cx="8977139" cy="4449357"/>
+          </a:xfrm>
+          <a:prstGeom prst="rect">
+            <a:avLst/>
+          </a:prstGeom>
+        </p:spPr>
+        <p:txBody>
+          <a:bodyPr lIns="91425" tIns="91425" rIns="91425" bIns="91425" anchor="t" anchorCtr="0">
+            <a:noAutofit/>
+          </a:bodyPr>
+          <a:lstStyle/>
+          <a:p>
+            <a:pPr marL="342900" indent="-342900"/>
+            <a:r>
+              <a:rPr lang="en-US" dirty="0"/>
+              <a:t>A class depends on all classes referenced by resolvable accesses within it, not including accesses within paths.</a:t>
+            </a:r>
+          </a:p>
+          <a:p>
+            <a:pPr marL="342900" indent="-342900"/>
+            <a:r>
+              <a:rPr lang="en-US" dirty="0"/>
+              <a:t>A class depends on its enclosing class.</a:t>
+            </a:r>
+          </a:p>
+          <a:p>
+            <a:pPr marL="342900" indent="-342900"/>
+            <a:r>
+              <a:rPr lang="en-US" dirty="0"/>
+              <a:t>A class depends on all classes referenced by access paths within it. A unresolvable access can still contain resolvable accesses within its path.</a:t>
+            </a:r>
+          </a:p>
+          <a:p>
+            <a:pPr marL="342900" lvl="0" indent="-342900">
+              <a:buFont typeface="+mj-lt"/>
+              <a:buAutoNum type="arabicPeriod"/>
+            </a:pPr>
+            <a:endParaRPr dirty="0"/>
+          </a:p>
+        </p:txBody>
+      </p:sp>
+    </p:spTree>
+  </p:cSld>
+  <p:clrMapOvr>
+    <a:masterClrMapping/>
+  </p:clrMapOvr>
+</p:sld>
+</file>
+
+<file path=ppt/slides/slide8.xml><?xml version="1.0" encoding="utf-8"?>
+<p:sld xmlns:a="http://schemas.openxmlformats.org/drawingml/2006/main" xmlns:r="http://schemas.openxmlformats.org/officeDocument/2006/relationships" xmlns:p="http://schemas.openxmlformats.org/presentationml/2006/main">
+  <p:cSld>
+    <p:spTree>
+      <p:nvGrpSpPr>
+        <p:cNvPr id="1" name=""/>
+        <p:cNvGrpSpPr/>
+        <p:nvPr/>
+      </p:nvGrpSpPr>
+      <p:grpSpPr>
+        <a:xfrm>
+          <a:off x="0" y="0"/>
+          <a:ext cx="0" cy="0"/>
+          <a:chOff x="0" y="0"/>
+          <a:chExt cx="0" cy="0"/>
+        </a:xfrm>
+      </p:grpSpPr>
+      <p:sp>
+        <p:nvSpPr>
+          <p:cNvPr id="2" name="Title 1">
+            <a:extLst>
+              <a:ext uri="{FF2B5EF4-FFF2-40B4-BE49-F238E27FC236}">
+                <a16:creationId xmlns:a16="http://schemas.microsoft.com/office/drawing/2014/main" id="{2944E445-2DA2-41DB-AAFE-0FD1EDD6F21B}"/>
+              </a:ext>
+            </a:extLst>
+          </p:cNvPr>
+          <p:cNvSpPr>
+            <a:spLocks noGrp="1"/>
+          </p:cNvSpPr>
+          <p:nvPr>
+            <p:ph type="title"/>
+          </p:nvPr>
+        </p:nvSpPr>
+        <p:spPr/>
+        <p:txBody>
+          <a:bodyPr/>
+          <a:lstStyle/>
+          <a:p>
+            <a:r>
+              <a:rPr lang="sv-SE" dirty="0"/>
+              <a:t>Dependency rules</a:t>
+            </a:r>
+            <a:endParaRPr lang="en-US" dirty="0"/>
+          </a:p>
+        </p:txBody>
+      </p:sp>
+      <p:sp>
+        <p:nvSpPr>
+          <p:cNvPr id="3" name="Rectangle 2">
+            <a:extLst>
+              <a:ext uri="{FF2B5EF4-FFF2-40B4-BE49-F238E27FC236}">
+                <a16:creationId xmlns:a16="http://schemas.microsoft.com/office/drawing/2014/main" id="{36A5D3DB-15F4-4F1B-A1B7-5D43E6E7C4DE}"/>
+              </a:ext>
+            </a:extLst>
+          </p:cNvPr>
+          <p:cNvSpPr/>
+          <p:nvPr/>
+        </p:nvSpPr>
+        <p:spPr>
+          <a:xfrm>
+            <a:off x="166861" y="1148797"/>
+            <a:ext cx="8757989" cy="1571712"/>
+          </a:xfrm>
+          <a:prstGeom prst="rect">
+            <a:avLst/>
+          </a:prstGeom>
+        </p:spPr>
+        <p:txBody>
+          <a:bodyPr wrap="square">
+            <a:spAutoFit/>
+          </a:bodyPr>
+          <a:lstStyle/>
+          <a:p>
+            <a:pPr marL="342900" lvl="0" indent="-342900">
+              <a:lnSpc>
+                <a:spcPct val="115000"/>
+              </a:lnSpc>
+              <a:spcAft>
+                <a:spcPts val="1600"/>
+              </a:spcAft>
+              <a:buClr>
+                <a:srgbClr val="737373"/>
+              </a:buClr>
+              <a:buSzPct val="100000"/>
+              <a:buFont typeface="Arial" panose="020B0604020202020204" pitchFamily="34" charset="0"/>
+              <a:buChar char="•"/>
+            </a:pPr>
+            <a:r>
+              <a:rPr lang="en-US" sz="1800" dirty="0">
+                <a:solidFill>
+                  <a:srgbClr val="737373"/>
+                </a:solidFill>
+                <a:latin typeface="Roboto"/>
+                <a:ea typeface="Roboto"/>
+                <a:sym typeface="Roboto"/>
+              </a:rPr>
+              <a:t>A class depends on all classes enclosed by an accessed class. This does not include access within paths but if an access is not resolvable, the last resolvable access in the path will be used instead. </a:t>
+            </a:r>
+          </a:p>
+          <a:p>
+            <a:pPr marL="342900" lvl="0" indent="-342900">
+              <a:lnSpc>
+                <a:spcPct val="115000"/>
+              </a:lnSpc>
+              <a:spcAft>
+                <a:spcPts val="1600"/>
+              </a:spcAft>
+              <a:buClr>
+                <a:srgbClr val="737373"/>
+              </a:buClr>
+              <a:buSzPct val="100000"/>
+              <a:buFont typeface="Arial" panose="020B0604020202020204" pitchFamily="34" charset="0"/>
+              <a:buChar char="•"/>
+            </a:pPr>
+            <a:r>
+              <a:rPr lang="en-US" sz="1800" dirty="0">
+                <a:solidFill>
+                  <a:srgbClr val="737373"/>
+                </a:solidFill>
+                <a:latin typeface="Roboto"/>
+                <a:ea typeface="Roboto"/>
+                <a:sym typeface="Roboto"/>
+              </a:rPr>
+              <a:t>Exception to Rule 4: Rule 4 is not applicable to import statements.</a:t>
+            </a:r>
+          </a:p>
+        </p:txBody>
+      </p:sp>
+    </p:spTree>
+    <p:extLst>
+      <p:ext uri="{BB962C8B-B14F-4D97-AF65-F5344CB8AC3E}">
+        <p14:creationId xmlns:p14="http://schemas.microsoft.com/office/powerpoint/2010/main" val="2123742391"/>
+      </p:ext>
+    </p:extLst>
+  </p:cSld>
+  <p:clrMapOvr>
+    <a:masterClrMapping/>
+  </p:clrMapOvr>
+</p:sld>
+</file>
+
+<file path=ppt/slides/slide9.xml><?xml version="1.0" encoding="utf-8"?>
+<p:sld xmlns:a="http://schemas.openxmlformats.org/drawingml/2006/main" xmlns:r="http://schemas.openxmlformats.org/officeDocument/2006/relationships" xmlns:p="http://schemas.openxmlformats.org/presentationml/2006/main">
+  <p:cSld>
+    <p:spTree>
+      <p:nvGrpSpPr>
+        <p:cNvPr id="1" name="Shape 103"/>
+        <p:cNvGrpSpPr/>
+        <p:nvPr/>
+      </p:nvGrpSpPr>
+      <p:grpSpPr>
+        <a:xfrm>
+          <a:off x="0" y="0"/>
+          <a:ext cx="0" cy="0"/>
+          <a:chOff x="0" y="0"/>
+          <a:chExt cx="0" cy="0"/>
+        </a:xfrm>
+      </p:grpSpPr>
+      <p:sp>
+        <p:nvSpPr>
+          <p:cNvPr id="104" name="Shape 104"/>
+          <p:cNvSpPr txBox="1">
+            <a:spLocks noGrp="1"/>
+          </p:cNvSpPr>
+          <p:nvPr>
+            <p:ph type="title"/>
+          </p:nvPr>
+        </p:nvSpPr>
+        <p:spPr>
+          <a:xfrm>
+            <a:off x="0" y="2095050"/>
+            <a:ext cx="3279000" cy="953400"/>
+          </a:xfrm>
+          <a:prstGeom prst="rect">
+            <a:avLst/>
+          </a:prstGeom>
+        </p:spPr>
+        <p:txBody>
+          <a:bodyPr lIns="91425" tIns="91425" rIns="91425" bIns="91425" anchor="ctr" anchorCtr="0">
+            <a:noAutofit/>
+          </a:bodyPr>
+          <a:lstStyle/>
+          <a:p>
+            <a:pPr lvl="0" algn="ctr" rtl="0">
+              <a:spcBef>
+                <a:spcPts val="0"/>
+              </a:spcBef>
+              <a:buNone/>
+            </a:pPr>
+            <a:r>
+              <a:rPr lang="sv"/>
+              <a:t>Added functionality in GUI</a:t>
+            </a:r>
+          </a:p>
+        </p:txBody>
+      </p:sp>
+      <p:pic>
+        <p:nvPicPr>
+          <p:cNvPr id="105" name="Shape 105" descr="MTT_Capture.PNG"/>
+          <p:cNvPicPr preferRelativeResize="0"/>
+          <p:nvPr/>
+        </p:nvPicPr>
+        <p:blipFill>
+          <a:blip r:embed="rId3">
+            <a:alphaModFix/>
+          </a:blip>
+          <a:stretch>
+            <a:fillRect/>
+          </a:stretch>
+        </p:blipFill>
+        <p:spPr>
+          <a:xfrm>
+            <a:off x="3405077" y="152400"/>
+            <a:ext cx="5570073" cy="4838698"/>
+          </a:xfrm>
+          <a:prstGeom prst="rect">
+            <a:avLst/>
+          </a:prstGeom>
+          <a:noFill/>
+          <a:ln>
+            <a:noFill/>
+          </a:ln>
+        </p:spPr>
+      </p:pic>
     </p:spTree>
   </p:cSld>
   <p:clrMapOvr>

</xml_diff>

<commit_message>
Updated dependency rules slide
</commit_message>
<xml_diff>
--- a/Exjobbspresentation.pptx
+++ b/Exjobbspresentation.pptx
@@ -3275,7 +3275,7 @@
             <a:fld id="{B61BEF0D-F0BB-DE4B-95CE-6DB70DBA9567}" type="datetimeFigureOut">
               <a:rPr lang="en-US" smtClean="0"/>
               <a:pPr/>
-              <a:t>17/08/23</a:t>
+              <a:t>17/08/24</a:t>
             </a:fld>
             <a:endParaRPr lang="en-US" dirty="0"/>
           </a:p>
@@ -3550,7 +3550,7 @@
             <a:fld id="{B61BEF0D-F0BB-DE4B-95CE-6DB70DBA9567}" type="datetimeFigureOut">
               <a:rPr lang="en-US" smtClean="0"/>
               <a:pPr/>
-              <a:t>17/08/23</a:t>
+              <a:t>17/08/24</a:t>
             </a:fld>
             <a:endParaRPr lang="en-US" dirty="0"/>
           </a:p>
@@ -3888,7 +3888,7 @@
             <a:fld id="{B61BEF0D-F0BB-DE4B-95CE-6DB70DBA9567}" type="datetimeFigureOut">
               <a:rPr lang="en-US" smtClean="0"/>
               <a:pPr/>
-              <a:t>17/08/23</a:t>
+              <a:t>17/08/24</a:t>
             </a:fld>
             <a:endParaRPr lang="en-US" dirty="0"/>
           </a:p>
@@ -4245,7 +4245,7 @@
             <a:fld id="{B61BEF0D-F0BB-DE4B-95CE-6DB70DBA9567}" type="datetimeFigureOut">
               <a:rPr lang="en-US" smtClean="0"/>
               <a:pPr/>
-              <a:t>17/08/23</a:t>
+              <a:t>17/08/24</a:t>
             </a:fld>
             <a:endParaRPr lang="en-US" dirty="0"/>
           </a:p>
@@ -4583,7 +4583,7 @@
             <a:fld id="{B61BEF0D-F0BB-DE4B-95CE-6DB70DBA9567}" type="datetimeFigureOut">
               <a:rPr lang="en-US" smtClean="0"/>
               <a:pPr/>
-              <a:t>17/08/23</a:t>
+              <a:t>17/08/24</a:t>
             </a:fld>
             <a:endParaRPr lang="en-US" dirty="0"/>
           </a:p>
@@ -5000,7 +5000,7 @@
             <a:fld id="{B61BEF0D-F0BB-DE4B-95CE-6DB70DBA9567}" type="datetimeFigureOut">
               <a:rPr lang="en-US" smtClean="0"/>
               <a:pPr/>
-              <a:t>17/08/23</a:t>
+              <a:t>17/08/24</a:t>
             </a:fld>
             <a:endParaRPr lang="en-US" dirty="0"/>
           </a:p>
@@ -5193,7 +5193,7 @@
           <a:p>
             <a:fld id="{55C6B4A9-1611-4792-9094-5F34BCA07E0B}" type="datetimeFigureOut">
               <a:rPr lang="en-US" smtClean="0"/>
-              <a:t>17/08/23</a:t>
+              <a:t>17/08/24</a:t>
             </a:fld>
             <a:endParaRPr lang="en-US" dirty="0"/>
           </a:p>
@@ -5397,7 +5397,7 @@
             <a:fld id="{B61BEF0D-F0BB-DE4B-95CE-6DB70DBA9567}" type="datetimeFigureOut">
               <a:rPr lang="en-US" smtClean="0"/>
               <a:pPr/>
-              <a:t>17/08/23</a:t>
+              <a:t>17/08/24</a:t>
             </a:fld>
             <a:endParaRPr lang="en-US" dirty="0"/>
           </a:p>
@@ -6154,7 +6154,7 @@
             <a:fld id="{B61BEF0D-F0BB-DE4B-95CE-6DB70DBA9567}" type="datetimeFigureOut">
               <a:rPr lang="en-US" smtClean="0"/>
               <a:pPr/>
-              <a:t>17/08/23</a:t>
+              <a:t>17/08/24</a:t>
             </a:fld>
             <a:endParaRPr lang="en-US" dirty="0"/>
           </a:p>
@@ -6425,7 +6425,7 @@
             <a:fld id="{B61BEF0D-F0BB-DE4B-95CE-6DB70DBA9567}" type="datetimeFigureOut">
               <a:rPr lang="en-US" smtClean="0"/>
               <a:pPr/>
-              <a:t>17/08/23</a:t>
+              <a:t>17/08/24</a:t>
             </a:fld>
             <a:endParaRPr lang="en-US" dirty="0"/>
           </a:p>
@@ -6680,7 +6680,7 @@
           <a:p>
             <a:fld id="{EB712588-04B1-427B-82EE-E8DB90309F08}" type="datetimeFigureOut">
               <a:rPr lang="en-US" smtClean="0"/>
-              <a:t>17/08/23</a:t>
+              <a:t>17/08/24</a:t>
             </a:fld>
             <a:endParaRPr lang="en-US" dirty="0"/>
           </a:p>
@@ -7078,7 +7078,7 @@
             <a:fld id="{B61BEF0D-F0BB-DE4B-95CE-6DB70DBA9567}" type="datetimeFigureOut">
               <a:rPr lang="en-US" smtClean="0"/>
               <a:pPr/>
-              <a:t>17/08/23</a:t>
+              <a:t>17/08/24</a:t>
             </a:fld>
             <a:endParaRPr lang="en-US" dirty="0"/>
           </a:p>
@@ -7225,7 +7225,7 @@
             <a:fld id="{B61BEF0D-F0BB-DE4B-95CE-6DB70DBA9567}" type="datetimeFigureOut">
               <a:rPr lang="en-US" smtClean="0"/>
               <a:pPr/>
-              <a:t>17/08/23</a:t>
+              <a:t>17/08/24</a:t>
             </a:fld>
             <a:endParaRPr lang="en-US" dirty="0"/>
           </a:p>
@@ -7344,7 +7344,7 @@
             <a:fld id="{B61BEF0D-F0BB-DE4B-95CE-6DB70DBA9567}" type="datetimeFigureOut">
               <a:rPr lang="en-US" smtClean="0"/>
               <a:pPr/>
-              <a:t>17/08/23</a:t>
+              <a:t>17/08/24</a:t>
             </a:fld>
             <a:endParaRPr lang="en-US" dirty="0"/>
           </a:p>
@@ -7622,7 +7622,7 @@
           <a:p>
             <a:fld id="{42A54C80-263E-416B-A8E0-580EDEADCBDC}" type="datetimeFigureOut">
               <a:rPr lang="en-US" smtClean="0"/>
-              <a:t>17/08/23</a:t>
+              <a:t>17/08/24</a:t>
             </a:fld>
             <a:endParaRPr lang="en-US" dirty="0"/>
           </a:p>
@@ -7973,7 +7973,7 @@
             <a:fld id="{B61BEF0D-F0BB-DE4B-95CE-6DB70DBA9567}" type="datetimeFigureOut">
               <a:rPr lang="en-US" smtClean="0"/>
               <a:pPr/>
-              <a:t>17/08/23</a:t>
+              <a:t>17/08/24</a:t>
             </a:fld>
             <a:endParaRPr lang="en-US" dirty="0"/>
           </a:p>
@@ -8677,7 +8677,7 @@
             <a:fld id="{B61BEF0D-F0BB-DE4B-95CE-6DB70DBA9567}" type="datetimeFigureOut">
               <a:rPr lang="en-US" smtClean="0"/>
               <a:pPr/>
-              <a:t>17/08/23</a:t>
+              <a:t>17/08/24</a:t>
             </a:fld>
             <a:endParaRPr lang="en-US" dirty="0"/>
           </a:p>
@@ -15552,15 +15552,6 @@
             </a:r>
           </a:p>
           <a:p>
-            <a:pPr marL="0" lvl="0" indent="0">
-              <a:buNone/>
-            </a:pPr>
-            <a:r>
-              <a:rPr lang="en-US" dirty="0"/>
-              <a:t>Due to limitations in the compilation stage the solution is implemented in.</a:t>
-            </a:r>
-          </a:p>
-          <a:p>
             <a:pPr marL="342900" lvl="0" indent="-342900">
               <a:buFont typeface="+mj-lt"/>
               <a:buAutoNum type="arabicPeriod" startAt="3"/>
@@ -15589,6 +15580,28 @@
               <a:rPr lang="en-US" dirty="0"/>
               <a:t>Exception to Rule 4: Rule 4 is not applicable to import statements.</a:t>
             </a:r>
+          </a:p>
+          <a:p>
+            <a:pPr marL="342900" lvl="0" indent="-342900">
+              <a:buFont typeface="+mj-lt"/>
+              <a:buAutoNum type="arabicPeriod" startAt="3"/>
+            </a:pPr>
+            <a:endParaRPr lang="sv-SE" dirty="0"/>
+          </a:p>
+          <a:p>
+            <a:pPr marL="0" indent="0">
+              <a:buNone/>
+            </a:pPr>
+            <a:r>
+              <a:rPr lang="en-US"/>
+              <a:t>Rule 4 and 5 are needed due to limitations in the compilation stage the solution is implemented in.</a:t>
+            </a:r>
+          </a:p>
+          <a:p>
+            <a:pPr marL="0" lvl="0" indent="0">
+              <a:buNone/>
+            </a:pPr>
+            <a:endParaRPr lang="en-US" dirty="0"/>
           </a:p>
           <a:p>
             <a:pPr marL="342900" lvl="0" indent="-342900">

</xml_diff>

<commit_message>
Fixed typos in presentation
</commit_message>
<xml_diff>
--- a/Exjobbspresentation.pptx
+++ b/Exjobbspresentation.pptx
@@ -3275,7 +3275,7 @@
             <a:fld id="{B61BEF0D-F0BB-DE4B-95CE-6DB70DBA9567}" type="datetimeFigureOut">
               <a:rPr lang="en-US" smtClean="0"/>
               <a:pPr/>
-              <a:t>17/08/24</a:t>
+              <a:t>2017-08-24</a:t>
             </a:fld>
             <a:endParaRPr lang="en-US" dirty="0"/>
           </a:p>
@@ -3550,7 +3550,7 @@
             <a:fld id="{B61BEF0D-F0BB-DE4B-95CE-6DB70DBA9567}" type="datetimeFigureOut">
               <a:rPr lang="en-US" smtClean="0"/>
               <a:pPr/>
-              <a:t>17/08/24</a:t>
+              <a:t>2017-08-24</a:t>
             </a:fld>
             <a:endParaRPr lang="en-US" dirty="0"/>
           </a:p>
@@ -3888,7 +3888,7 @@
             <a:fld id="{B61BEF0D-F0BB-DE4B-95CE-6DB70DBA9567}" type="datetimeFigureOut">
               <a:rPr lang="en-US" smtClean="0"/>
               <a:pPr/>
-              <a:t>17/08/24</a:t>
+              <a:t>2017-08-24</a:t>
             </a:fld>
             <a:endParaRPr lang="en-US" dirty="0"/>
           </a:p>
@@ -4245,7 +4245,7 @@
             <a:fld id="{B61BEF0D-F0BB-DE4B-95CE-6DB70DBA9567}" type="datetimeFigureOut">
               <a:rPr lang="en-US" smtClean="0"/>
               <a:pPr/>
-              <a:t>17/08/24</a:t>
+              <a:t>2017-08-24</a:t>
             </a:fld>
             <a:endParaRPr lang="en-US" dirty="0"/>
           </a:p>
@@ -4583,7 +4583,7 @@
             <a:fld id="{B61BEF0D-F0BB-DE4B-95CE-6DB70DBA9567}" type="datetimeFigureOut">
               <a:rPr lang="en-US" smtClean="0"/>
               <a:pPr/>
-              <a:t>17/08/24</a:t>
+              <a:t>2017-08-24</a:t>
             </a:fld>
             <a:endParaRPr lang="en-US" dirty="0"/>
           </a:p>
@@ -5000,7 +5000,7 @@
             <a:fld id="{B61BEF0D-F0BB-DE4B-95CE-6DB70DBA9567}" type="datetimeFigureOut">
               <a:rPr lang="en-US" smtClean="0"/>
               <a:pPr/>
-              <a:t>17/08/24</a:t>
+              <a:t>2017-08-24</a:t>
             </a:fld>
             <a:endParaRPr lang="en-US" dirty="0"/>
           </a:p>
@@ -5193,7 +5193,7 @@
           <a:p>
             <a:fld id="{55C6B4A9-1611-4792-9094-5F34BCA07E0B}" type="datetimeFigureOut">
               <a:rPr lang="en-US" smtClean="0"/>
-              <a:t>17/08/24</a:t>
+              <a:t>2017-08-24</a:t>
             </a:fld>
             <a:endParaRPr lang="en-US" dirty="0"/>
           </a:p>
@@ -5397,7 +5397,7 @@
             <a:fld id="{B61BEF0D-F0BB-DE4B-95CE-6DB70DBA9567}" type="datetimeFigureOut">
               <a:rPr lang="en-US" smtClean="0"/>
               <a:pPr/>
-              <a:t>17/08/24</a:t>
+              <a:t>2017-08-24</a:t>
             </a:fld>
             <a:endParaRPr lang="en-US" dirty="0"/>
           </a:p>
@@ -6154,7 +6154,7 @@
             <a:fld id="{B61BEF0D-F0BB-DE4B-95CE-6DB70DBA9567}" type="datetimeFigureOut">
               <a:rPr lang="en-US" smtClean="0"/>
               <a:pPr/>
-              <a:t>17/08/24</a:t>
+              <a:t>2017-08-24</a:t>
             </a:fld>
             <a:endParaRPr lang="en-US" dirty="0"/>
           </a:p>
@@ -6425,7 +6425,7 @@
             <a:fld id="{B61BEF0D-F0BB-DE4B-95CE-6DB70DBA9567}" type="datetimeFigureOut">
               <a:rPr lang="en-US" smtClean="0"/>
               <a:pPr/>
-              <a:t>17/08/24</a:t>
+              <a:t>2017-08-24</a:t>
             </a:fld>
             <a:endParaRPr lang="en-US" dirty="0"/>
           </a:p>
@@ -6680,7 +6680,7 @@
           <a:p>
             <a:fld id="{EB712588-04B1-427B-82EE-E8DB90309F08}" type="datetimeFigureOut">
               <a:rPr lang="en-US" smtClean="0"/>
-              <a:t>17/08/24</a:t>
+              <a:t>2017-08-24</a:t>
             </a:fld>
             <a:endParaRPr lang="en-US" dirty="0"/>
           </a:p>
@@ -7078,7 +7078,7 @@
             <a:fld id="{B61BEF0D-F0BB-DE4B-95CE-6DB70DBA9567}" type="datetimeFigureOut">
               <a:rPr lang="en-US" smtClean="0"/>
               <a:pPr/>
-              <a:t>17/08/24</a:t>
+              <a:t>2017-08-24</a:t>
             </a:fld>
             <a:endParaRPr lang="en-US" dirty="0"/>
           </a:p>
@@ -7225,7 +7225,7 @@
             <a:fld id="{B61BEF0D-F0BB-DE4B-95CE-6DB70DBA9567}" type="datetimeFigureOut">
               <a:rPr lang="en-US" smtClean="0"/>
               <a:pPr/>
-              <a:t>17/08/24</a:t>
+              <a:t>2017-08-24</a:t>
             </a:fld>
             <a:endParaRPr lang="en-US" dirty="0"/>
           </a:p>
@@ -7344,7 +7344,7 @@
             <a:fld id="{B61BEF0D-F0BB-DE4B-95CE-6DB70DBA9567}" type="datetimeFigureOut">
               <a:rPr lang="en-US" smtClean="0"/>
               <a:pPr/>
-              <a:t>17/08/24</a:t>
+              <a:t>2017-08-24</a:t>
             </a:fld>
             <a:endParaRPr lang="en-US" dirty="0"/>
           </a:p>
@@ -7622,7 +7622,7 @@
           <a:p>
             <a:fld id="{42A54C80-263E-416B-A8E0-580EDEADCBDC}" type="datetimeFigureOut">
               <a:rPr lang="en-US" smtClean="0"/>
-              <a:t>17/08/24</a:t>
+              <a:t>2017-08-24</a:t>
             </a:fld>
             <a:endParaRPr lang="en-US" dirty="0"/>
           </a:p>
@@ -7973,7 +7973,7 @@
             <a:fld id="{B61BEF0D-F0BB-DE4B-95CE-6DB70DBA9567}" type="datetimeFigureOut">
               <a:rPr lang="en-US" smtClean="0"/>
               <a:pPr/>
-              <a:t>17/08/24</a:t>
+              <a:t>2017-08-24</a:t>
             </a:fld>
             <a:endParaRPr lang="en-US" dirty="0"/>
           </a:p>
@@ -8677,7 +8677,7 @@
             <a:fld id="{B61BEF0D-F0BB-DE4B-95CE-6DB70DBA9567}" type="datetimeFigureOut">
               <a:rPr lang="en-US" smtClean="0"/>
               <a:pPr/>
-              <a:t>17/08/24</a:t>
+              <a:t>2017-08-24</a:t>
             </a:fld>
             <a:endParaRPr lang="en-US" dirty="0"/>
           </a:p>
@@ -10301,7 +10301,7 @@
                 <a:latin typeface="Courier New" panose="02070309020205020404" pitchFamily="49" charset="0"/>
                 <a:cs typeface="Courier New" panose="02070309020205020404" pitchFamily="49" charset="0"/>
               </a:rPr>
-              <a:t> B;</a:t>
+              <a:t> M;</a:t>
             </a:r>
           </a:p>
           <a:p>
@@ -11431,8 +11431,8 @@
         </p:nvSpPr>
         <p:spPr>
           <a:xfrm>
-            <a:off x="4246109" y="4867196"/>
-            <a:ext cx="805343" cy="369332"/>
+            <a:off x="4084294" y="4871998"/>
+            <a:ext cx="1128973" cy="369332"/>
           </a:xfrm>
           <a:prstGeom prst="rect">
             <a:avLst/>
@@ -11447,9 +11447,14 @@
           <a:p>
             <a:pPr algn="ctr"/>
             <a:r>
-              <a:rPr lang="en-US" dirty="0"/>
-              <a:t>File</a:t>
-            </a:r>
+              <a:rPr lang="sv-SE" dirty="0"/>
+              <a:t>C</a:t>
+            </a:r>
+            <a:r>
+              <a:rPr lang="en-US" dirty="0" err="1"/>
+              <a:t>ommit</a:t>
+            </a:r>
+            <a:endParaRPr lang="en-US" dirty="0"/>
           </a:p>
         </p:txBody>
       </p:sp>

</xml_diff>

<commit_message>
Changed a model to package
</commit_message>
<xml_diff>
--- a/Exjobbspresentation.pptx
+++ b/Exjobbspresentation.pptx
@@ -9482,28 +9482,35 @@
               <a:buNone/>
             </a:pPr>
             <a:r>
+              <a:rPr lang="da-DK" sz="1400">
+                <a:latin typeface="Courier New" panose="02070309020205020404" pitchFamily="49" charset="0"/>
+                <a:cs typeface="Courier New" panose="02070309020205020404" pitchFamily="49" charset="0"/>
+              </a:rPr>
+              <a:t>  </a:t>
+            </a:r>
+            <a:r>
+              <a:rPr lang="da-DK" sz="1400" b="1">
+                <a:solidFill>
+                  <a:srgbClr val="0000FF"/>
+                </a:solidFill>
+                <a:latin typeface="Courier New" panose="02070309020205020404" pitchFamily="49" charset="0"/>
+                <a:cs typeface="Courier New" panose="02070309020205020404" pitchFamily="49" charset="0"/>
+              </a:rPr>
+              <a:t>package</a:t>
+            </a:r>
+            <a:r>
+              <a:rPr lang="da-DK" sz="1400">
+                <a:latin typeface="Courier New" panose="02070309020205020404" pitchFamily="49" charset="0"/>
+                <a:cs typeface="Courier New" panose="02070309020205020404" pitchFamily="49" charset="0"/>
+              </a:rPr>
+              <a:t> </a:t>
+            </a:r>
+            <a:r>
               <a:rPr lang="da-DK" sz="1400" dirty="0">
                 <a:latin typeface="Courier New" panose="02070309020205020404" pitchFamily="49" charset="0"/>
                 <a:cs typeface="Courier New" panose="02070309020205020404" pitchFamily="49" charset="0"/>
               </a:rPr>
-              <a:t>  </a:t>
-            </a:r>
-            <a:r>
-              <a:rPr lang="da-DK" sz="1400" b="1" dirty="0">
-                <a:solidFill>
-                  <a:srgbClr val="0000FF"/>
-                </a:solidFill>
-                <a:latin typeface="Courier New" panose="02070309020205020404" pitchFamily="49" charset="0"/>
-                <a:cs typeface="Courier New" panose="02070309020205020404" pitchFamily="49" charset="0"/>
-              </a:rPr>
-              <a:t>model</a:t>
-            </a:r>
-            <a:r>
-              <a:rPr lang="da-DK" sz="1400" dirty="0">
-                <a:latin typeface="Courier New" panose="02070309020205020404" pitchFamily="49" charset="0"/>
-                <a:cs typeface="Courier New" panose="02070309020205020404" pitchFamily="49" charset="0"/>
-              </a:rPr>
-              <a:t> M1</a:t>
+              <a:t>M1</a:t>
             </a:r>
           </a:p>
           <a:p>
@@ -9873,7 +9880,7 @@
                 <a:latin typeface="Courier New" panose="02070309020205020404" pitchFamily="49" charset="0"/>
                 <a:cs typeface="Courier New" panose="02070309020205020404" pitchFamily="49" charset="0"/>
               </a:rPr>
-              <a:t>model</a:t>
+              <a:t>package</a:t>
             </a:r>
             <a:r>
               <a:rPr lang="da-DK" sz="1400" dirty="0">

</xml_diff>